<commit_message>
change dwc:Taxon color in ACS diagram
</commit_message>
<xml_diff>
--- a/img/acs-dsw-poster.pptx
+++ b/img/acs-dsw-poster.pptx
@@ -161,10 +161,9 @@
           <a:lstStyle/>
           <a:p>
             <a:r>
-              <a:rPr lang="en-US" smtClean="0"/>
+              <a:rPr lang="en-US"/>
               <a:t>Click to edit Master title style</a:t>
             </a:r>
-            <a:endParaRPr lang="en-US"/>
           </a:p>
         </p:txBody>
       </p:sp>
@@ -280,10 +279,9 @@
           </a:lstStyle>
           <a:p>
             <a:r>
-              <a:rPr lang="en-US" smtClean="0"/>
+              <a:rPr lang="en-US"/>
               <a:t>Click to edit Master subtitle style</a:t>
             </a:r>
-            <a:endParaRPr lang="en-US"/>
           </a:p>
         </p:txBody>
       </p:sp>
@@ -304,7 +302,7 @@
           <a:p>
             <a:fld id="{CC04084B-2F15-419C-AA91-DBD329B3D928}" type="datetimeFigureOut">
               <a:rPr lang="en-US" smtClean="0"/>
-              <a:t>7/18/2016</a:t>
+              <a:t>7/18/2019</a:t>
             </a:fld>
             <a:endParaRPr lang="en-US"/>
           </a:p>
@@ -398,10 +396,9 @@
           <a:lstStyle/>
           <a:p>
             <a:r>
-              <a:rPr lang="en-US" smtClean="0"/>
+              <a:rPr lang="en-US"/>
               <a:t>Click to edit Master title style</a:t>
             </a:r>
-            <a:endParaRPr lang="en-US"/>
           </a:p>
         </p:txBody>
       </p:sp>
@@ -422,38 +419,37 @@
           <a:p>
             <a:pPr lvl="0"/>
             <a:r>
-              <a:rPr lang="en-US" smtClean="0"/>
+              <a:rPr lang="en-US"/>
               <a:t>Click to edit Master text styles</a:t>
             </a:r>
           </a:p>
           <a:p>
             <a:pPr lvl="1"/>
             <a:r>
-              <a:rPr lang="en-US" smtClean="0"/>
+              <a:rPr lang="en-US"/>
               <a:t>Second level</a:t>
             </a:r>
           </a:p>
           <a:p>
             <a:pPr lvl="2"/>
             <a:r>
-              <a:rPr lang="en-US" smtClean="0"/>
+              <a:rPr lang="en-US"/>
               <a:t>Third level</a:t>
             </a:r>
           </a:p>
           <a:p>
             <a:pPr lvl="3"/>
             <a:r>
-              <a:rPr lang="en-US" smtClean="0"/>
+              <a:rPr lang="en-US"/>
               <a:t>Fourth level</a:t>
             </a:r>
           </a:p>
           <a:p>
             <a:pPr lvl="4"/>
             <a:r>
-              <a:rPr lang="en-US" smtClean="0"/>
+              <a:rPr lang="en-US"/>
               <a:t>Fifth level</a:t>
             </a:r>
-            <a:endParaRPr lang="en-US"/>
           </a:p>
         </p:txBody>
       </p:sp>
@@ -474,7 +470,7 @@
           <a:p>
             <a:fld id="{CC04084B-2F15-419C-AA91-DBD329B3D928}" type="datetimeFigureOut">
               <a:rPr lang="en-US" smtClean="0"/>
-              <a:t>7/18/2016</a:t>
+              <a:t>7/18/2019</a:t>
             </a:fld>
             <a:endParaRPr lang="en-US"/>
           </a:p>
@@ -573,10 +569,9 @@
           <a:lstStyle/>
           <a:p>
             <a:r>
-              <a:rPr lang="en-US" smtClean="0"/>
+              <a:rPr lang="en-US"/>
               <a:t>Click to edit Master title style</a:t>
             </a:r>
-            <a:endParaRPr lang="en-US"/>
           </a:p>
         </p:txBody>
       </p:sp>
@@ -602,38 +597,37 @@
           <a:p>
             <a:pPr lvl="0"/>
             <a:r>
-              <a:rPr lang="en-US" smtClean="0"/>
+              <a:rPr lang="en-US"/>
               <a:t>Click to edit Master text styles</a:t>
             </a:r>
           </a:p>
           <a:p>
             <a:pPr lvl="1"/>
             <a:r>
-              <a:rPr lang="en-US" smtClean="0"/>
+              <a:rPr lang="en-US"/>
               <a:t>Second level</a:t>
             </a:r>
           </a:p>
           <a:p>
             <a:pPr lvl="2"/>
             <a:r>
-              <a:rPr lang="en-US" smtClean="0"/>
+              <a:rPr lang="en-US"/>
               <a:t>Third level</a:t>
             </a:r>
           </a:p>
           <a:p>
             <a:pPr lvl="3"/>
             <a:r>
-              <a:rPr lang="en-US" smtClean="0"/>
+              <a:rPr lang="en-US"/>
               <a:t>Fourth level</a:t>
             </a:r>
           </a:p>
           <a:p>
             <a:pPr lvl="4"/>
             <a:r>
-              <a:rPr lang="en-US" smtClean="0"/>
+              <a:rPr lang="en-US"/>
               <a:t>Fifth level</a:t>
             </a:r>
-            <a:endParaRPr lang="en-US"/>
           </a:p>
         </p:txBody>
       </p:sp>
@@ -654,7 +648,7 @@
           <a:p>
             <a:fld id="{CC04084B-2F15-419C-AA91-DBD329B3D928}" type="datetimeFigureOut">
               <a:rPr lang="en-US" smtClean="0"/>
-              <a:t>7/18/2016</a:t>
+              <a:t>7/18/2019</a:t>
             </a:fld>
             <a:endParaRPr lang="en-US"/>
           </a:p>
@@ -748,10 +742,9 @@
           <a:lstStyle/>
           <a:p>
             <a:r>
-              <a:rPr lang="en-US" smtClean="0"/>
+              <a:rPr lang="en-US"/>
               <a:t>Click to edit Master title style</a:t>
             </a:r>
-            <a:endParaRPr lang="en-US"/>
           </a:p>
         </p:txBody>
       </p:sp>
@@ -772,38 +765,37 @@
           <a:p>
             <a:pPr lvl="0"/>
             <a:r>
-              <a:rPr lang="en-US" smtClean="0"/>
+              <a:rPr lang="en-US"/>
               <a:t>Click to edit Master text styles</a:t>
             </a:r>
           </a:p>
           <a:p>
             <a:pPr lvl="1"/>
             <a:r>
-              <a:rPr lang="en-US" smtClean="0"/>
+              <a:rPr lang="en-US"/>
               <a:t>Second level</a:t>
             </a:r>
           </a:p>
           <a:p>
             <a:pPr lvl="2"/>
             <a:r>
-              <a:rPr lang="en-US" smtClean="0"/>
+              <a:rPr lang="en-US"/>
               <a:t>Third level</a:t>
             </a:r>
           </a:p>
           <a:p>
             <a:pPr lvl="3"/>
             <a:r>
-              <a:rPr lang="en-US" smtClean="0"/>
+              <a:rPr lang="en-US"/>
               <a:t>Fourth level</a:t>
             </a:r>
           </a:p>
           <a:p>
             <a:pPr lvl="4"/>
             <a:r>
-              <a:rPr lang="en-US" smtClean="0"/>
+              <a:rPr lang="en-US"/>
               <a:t>Fifth level</a:t>
             </a:r>
-            <a:endParaRPr lang="en-US"/>
           </a:p>
         </p:txBody>
       </p:sp>
@@ -824,7 +816,7 @@
           <a:p>
             <a:fld id="{CC04084B-2F15-419C-AA91-DBD329B3D928}" type="datetimeFigureOut">
               <a:rPr lang="en-US" smtClean="0"/>
-              <a:t>7/18/2016</a:t>
+              <a:t>7/18/2019</a:t>
             </a:fld>
             <a:endParaRPr lang="en-US"/>
           </a:p>
@@ -927,10 +919,9 @@
           </a:lstStyle>
           <a:p>
             <a:r>
-              <a:rPr lang="en-US" smtClean="0"/>
+              <a:rPr lang="en-US"/>
               <a:t>Click to edit Master title style</a:t>
             </a:r>
-            <a:endParaRPr lang="en-US"/>
           </a:p>
         </p:txBody>
       </p:sp>
@@ -1047,7 +1038,7 @@
           <a:p>
             <a:pPr lvl="0"/>
             <a:r>
-              <a:rPr lang="en-US" smtClean="0"/>
+              <a:rPr lang="en-US"/>
               <a:t>Click to edit Master text styles</a:t>
             </a:r>
           </a:p>
@@ -1070,7 +1061,7 @@
           <a:p>
             <a:fld id="{CC04084B-2F15-419C-AA91-DBD329B3D928}" type="datetimeFigureOut">
               <a:rPr lang="en-US" smtClean="0"/>
-              <a:t>7/18/2016</a:t>
+              <a:t>7/18/2019</a:t>
             </a:fld>
             <a:endParaRPr lang="en-US"/>
           </a:p>
@@ -1164,10 +1155,9 @@
           <a:lstStyle/>
           <a:p>
             <a:r>
-              <a:rPr lang="en-US" smtClean="0"/>
+              <a:rPr lang="en-US"/>
               <a:t>Click to edit Master title style</a:t>
             </a:r>
-            <a:endParaRPr lang="en-US"/>
           </a:p>
         </p:txBody>
       </p:sp>
@@ -1221,38 +1211,37 @@
           <a:p>
             <a:pPr lvl="0"/>
             <a:r>
-              <a:rPr lang="en-US" smtClean="0"/>
+              <a:rPr lang="en-US"/>
               <a:t>Click to edit Master text styles</a:t>
             </a:r>
           </a:p>
           <a:p>
             <a:pPr lvl="1"/>
             <a:r>
-              <a:rPr lang="en-US" smtClean="0"/>
+              <a:rPr lang="en-US"/>
               <a:t>Second level</a:t>
             </a:r>
           </a:p>
           <a:p>
             <a:pPr lvl="2"/>
             <a:r>
-              <a:rPr lang="en-US" smtClean="0"/>
+              <a:rPr lang="en-US"/>
               <a:t>Third level</a:t>
             </a:r>
           </a:p>
           <a:p>
             <a:pPr lvl="3"/>
             <a:r>
-              <a:rPr lang="en-US" smtClean="0"/>
+              <a:rPr lang="en-US"/>
               <a:t>Fourth level</a:t>
             </a:r>
           </a:p>
           <a:p>
             <a:pPr lvl="4"/>
             <a:r>
-              <a:rPr lang="en-US" smtClean="0"/>
+              <a:rPr lang="en-US"/>
               <a:t>Fifth level</a:t>
             </a:r>
-            <a:endParaRPr lang="en-US"/>
           </a:p>
         </p:txBody>
       </p:sp>
@@ -1306,38 +1295,37 @@
           <a:p>
             <a:pPr lvl="0"/>
             <a:r>
-              <a:rPr lang="en-US" smtClean="0"/>
+              <a:rPr lang="en-US"/>
               <a:t>Click to edit Master text styles</a:t>
             </a:r>
           </a:p>
           <a:p>
             <a:pPr lvl="1"/>
             <a:r>
-              <a:rPr lang="en-US" smtClean="0"/>
+              <a:rPr lang="en-US"/>
               <a:t>Second level</a:t>
             </a:r>
           </a:p>
           <a:p>
             <a:pPr lvl="2"/>
             <a:r>
-              <a:rPr lang="en-US" smtClean="0"/>
+              <a:rPr lang="en-US"/>
               <a:t>Third level</a:t>
             </a:r>
           </a:p>
           <a:p>
             <a:pPr lvl="3"/>
             <a:r>
-              <a:rPr lang="en-US" smtClean="0"/>
+              <a:rPr lang="en-US"/>
               <a:t>Fourth level</a:t>
             </a:r>
           </a:p>
           <a:p>
             <a:pPr lvl="4"/>
             <a:r>
-              <a:rPr lang="en-US" smtClean="0"/>
+              <a:rPr lang="en-US"/>
               <a:t>Fifth level</a:t>
             </a:r>
-            <a:endParaRPr lang="en-US"/>
           </a:p>
         </p:txBody>
       </p:sp>
@@ -1358,7 +1346,7 @@
           <a:p>
             <a:fld id="{CC04084B-2F15-419C-AA91-DBD329B3D928}" type="datetimeFigureOut">
               <a:rPr lang="en-US" smtClean="0"/>
-              <a:t>7/18/2016</a:t>
+              <a:t>7/18/2019</a:t>
             </a:fld>
             <a:endParaRPr lang="en-US"/>
           </a:p>
@@ -1461,10 +1449,9 @@
           </a:lstStyle>
           <a:p>
             <a:r>
-              <a:rPr lang="en-US" smtClean="0"/>
+              <a:rPr lang="en-US"/>
               <a:t>Click to edit Master title style</a:t>
             </a:r>
-            <a:endParaRPr lang="en-US"/>
           </a:p>
         </p:txBody>
       </p:sp>
@@ -1527,7 +1514,7 @@
           <a:p>
             <a:pPr lvl="0"/>
             <a:r>
-              <a:rPr lang="en-US" smtClean="0"/>
+              <a:rPr lang="en-US"/>
               <a:t>Click to edit Master text styles</a:t>
             </a:r>
           </a:p>
@@ -1583,38 +1570,37 @@
           <a:p>
             <a:pPr lvl="0"/>
             <a:r>
-              <a:rPr lang="en-US" smtClean="0"/>
+              <a:rPr lang="en-US"/>
               <a:t>Click to edit Master text styles</a:t>
             </a:r>
           </a:p>
           <a:p>
             <a:pPr lvl="1"/>
             <a:r>
-              <a:rPr lang="en-US" smtClean="0"/>
+              <a:rPr lang="en-US"/>
               <a:t>Second level</a:t>
             </a:r>
           </a:p>
           <a:p>
             <a:pPr lvl="2"/>
             <a:r>
-              <a:rPr lang="en-US" smtClean="0"/>
+              <a:rPr lang="en-US"/>
               <a:t>Third level</a:t>
             </a:r>
           </a:p>
           <a:p>
             <a:pPr lvl="3"/>
             <a:r>
-              <a:rPr lang="en-US" smtClean="0"/>
+              <a:rPr lang="en-US"/>
               <a:t>Fourth level</a:t>
             </a:r>
           </a:p>
           <a:p>
             <a:pPr lvl="4"/>
             <a:r>
-              <a:rPr lang="en-US" smtClean="0"/>
+              <a:rPr lang="en-US"/>
               <a:t>Fifth level</a:t>
             </a:r>
-            <a:endParaRPr lang="en-US"/>
           </a:p>
         </p:txBody>
       </p:sp>
@@ -1677,7 +1663,7 @@
           <a:p>
             <a:pPr lvl="0"/>
             <a:r>
-              <a:rPr lang="en-US" smtClean="0"/>
+              <a:rPr lang="en-US"/>
               <a:t>Click to edit Master text styles</a:t>
             </a:r>
           </a:p>
@@ -1733,38 +1719,37 @@
           <a:p>
             <a:pPr lvl="0"/>
             <a:r>
-              <a:rPr lang="en-US" smtClean="0"/>
+              <a:rPr lang="en-US"/>
               <a:t>Click to edit Master text styles</a:t>
             </a:r>
           </a:p>
           <a:p>
             <a:pPr lvl="1"/>
             <a:r>
-              <a:rPr lang="en-US" smtClean="0"/>
+              <a:rPr lang="en-US"/>
               <a:t>Second level</a:t>
             </a:r>
           </a:p>
           <a:p>
             <a:pPr lvl="2"/>
             <a:r>
-              <a:rPr lang="en-US" smtClean="0"/>
+              <a:rPr lang="en-US"/>
               <a:t>Third level</a:t>
             </a:r>
           </a:p>
           <a:p>
             <a:pPr lvl="3"/>
             <a:r>
-              <a:rPr lang="en-US" smtClean="0"/>
+              <a:rPr lang="en-US"/>
               <a:t>Fourth level</a:t>
             </a:r>
           </a:p>
           <a:p>
             <a:pPr lvl="4"/>
             <a:r>
-              <a:rPr lang="en-US" smtClean="0"/>
+              <a:rPr lang="en-US"/>
               <a:t>Fifth level</a:t>
             </a:r>
-            <a:endParaRPr lang="en-US"/>
           </a:p>
         </p:txBody>
       </p:sp>
@@ -1785,7 +1770,7 @@
           <a:p>
             <a:fld id="{CC04084B-2F15-419C-AA91-DBD329B3D928}" type="datetimeFigureOut">
               <a:rPr lang="en-US" smtClean="0"/>
-              <a:t>7/18/2016</a:t>
+              <a:t>7/18/2019</a:t>
             </a:fld>
             <a:endParaRPr lang="en-US"/>
           </a:p>
@@ -1879,10 +1864,9 @@
           <a:lstStyle/>
           <a:p>
             <a:r>
-              <a:rPr lang="en-US" smtClean="0"/>
+              <a:rPr lang="en-US"/>
               <a:t>Click to edit Master title style</a:t>
             </a:r>
-            <a:endParaRPr lang="en-US"/>
           </a:p>
         </p:txBody>
       </p:sp>
@@ -1903,7 +1887,7 @@
           <a:p>
             <a:fld id="{CC04084B-2F15-419C-AA91-DBD329B3D928}" type="datetimeFigureOut">
               <a:rPr lang="en-US" smtClean="0"/>
-              <a:t>7/18/2016</a:t>
+              <a:t>7/18/2019</a:t>
             </a:fld>
             <a:endParaRPr lang="en-US"/>
           </a:p>
@@ -1998,7 +1982,7 @@
           <a:p>
             <a:fld id="{CC04084B-2F15-419C-AA91-DBD329B3D928}" type="datetimeFigureOut">
               <a:rPr lang="en-US" smtClean="0"/>
-              <a:t>7/18/2016</a:t>
+              <a:t>7/18/2019</a:t>
             </a:fld>
             <a:endParaRPr lang="en-US"/>
           </a:p>
@@ -2101,10 +2085,9 @@
           </a:lstStyle>
           <a:p>
             <a:r>
-              <a:rPr lang="en-US" smtClean="0"/>
+              <a:rPr lang="en-US"/>
               <a:t>Click to edit Master title style</a:t>
             </a:r>
-            <a:endParaRPr lang="en-US"/>
           </a:p>
         </p:txBody>
       </p:sp>
@@ -2158,38 +2141,37 @@
           <a:p>
             <a:pPr lvl="0"/>
             <a:r>
-              <a:rPr lang="en-US" smtClean="0"/>
+              <a:rPr lang="en-US"/>
               <a:t>Click to edit Master text styles</a:t>
             </a:r>
           </a:p>
           <a:p>
             <a:pPr lvl="1"/>
             <a:r>
-              <a:rPr lang="en-US" smtClean="0"/>
+              <a:rPr lang="en-US"/>
               <a:t>Second level</a:t>
             </a:r>
           </a:p>
           <a:p>
             <a:pPr lvl="2"/>
             <a:r>
-              <a:rPr lang="en-US" smtClean="0"/>
+              <a:rPr lang="en-US"/>
               <a:t>Third level</a:t>
             </a:r>
           </a:p>
           <a:p>
             <a:pPr lvl="3"/>
             <a:r>
-              <a:rPr lang="en-US" smtClean="0"/>
+              <a:rPr lang="en-US"/>
               <a:t>Fourth level</a:t>
             </a:r>
           </a:p>
           <a:p>
             <a:pPr lvl="4"/>
             <a:r>
-              <a:rPr lang="en-US" smtClean="0"/>
+              <a:rPr lang="en-US"/>
               <a:t>Fifth level</a:t>
             </a:r>
-            <a:endParaRPr lang="en-US"/>
           </a:p>
         </p:txBody>
       </p:sp>
@@ -2252,7 +2234,7 @@
           <a:p>
             <a:pPr lvl="0"/>
             <a:r>
-              <a:rPr lang="en-US" smtClean="0"/>
+              <a:rPr lang="en-US"/>
               <a:t>Click to edit Master text styles</a:t>
             </a:r>
           </a:p>
@@ -2275,7 +2257,7 @@
           <a:p>
             <a:fld id="{CC04084B-2F15-419C-AA91-DBD329B3D928}" type="datetimeFigureOut">
               <a:rPr lang="en-US" smtClean="0"/>
-              <a:t>7/18/2016</a:t>
+              <a:t>7/18/2019</a:t>
             </a:fld>
             <a:endParaRPr lang="en-US"/>
           </a:p>
@@ -2378,10 +2360,9 @@
           </a:lstStyle>
           <a:p>
             <a:r>
-              <a:rPr lang="en-US" smtClean="0"/>
+              <a:rPr lang="en-US"/>
               <a:t>Click to edit Master title style</a:t>
             </a:r>
-            <a:endParaRPr lang="en-US"/>
           </a:p>
         </p:txBody>
       </p:sp>
@@ -2505,7 +2486,7 @@
           <a:p>
             <a:pPr lvl="0"/>
             <a:r>
-              <a:rPr lang="en-US" smtClean="0"/>
+              <a:rPr lang="en-US"/>
               <a:t>Click to edit Master text styles</a:t>
             </a:r>
           </a:p>
@@ -2528,7 +2509,7 @@
           <a:p>
             <a:fld id="{CC04084B-2F15-419C-AA91-DBD329B3D928}" type="datetimeFigureOut">
               <a:rPr lang="en-US" smtClean="0"/>
-              <a:t>7/18/2016</a:t>
+              <a:t>7/18/2019</a:t>
             </a:fld>
             <a:endParaRPr lang="en-US"/>
           </a:p>
@@ -2637,10 +2618,9 @@
           <a:lstStyle/>
           <a:p>
             <a:r>
-              <a:rPr lang="en-US" smtClean="0"/>
+              <a:rPr lang="en-US"/>
               <a:t>Click to edit Master title style</a:t>
             </a:r>
-            <a:endParaRPr lang="en-US"/>
           </a:p>
         </p:txBody>
       </p:sp>
@@ -2671,38 +2651,37 @@
           <a:p>
             <a:pPr lvl="0"/>
             <a:r>
-              <a:rPr lang="en-US" smtClean="0"/>
+              <a:rPr lang="en-US"/>
               <a:t>Click to edit Master text styles</a:t>
             </a:r>
           </a:p>
           <a:p>
             <a:pPr lvl="1"/>
             <a:r>
-              <a:rPr lang="en-US" smtClean="0"/>
+              <a:rPr lang="en-US"/>
               <a:t>Second level</a:t>
             </a:r>
           </a:p>
           <a:p>
             <a:pPr lvl="2"/>
             <a:r>
-              <a:rPr lang="en-US" smtClean="0"/>
+              <a:rPr lang="en-US"/>
               <a:t>Third level</a:t>
             </a:r>
           </a:p>
           <a:p>
             <a:pPr lvl="3"/>
             <a:r>
-              <a:rPr lang="en-US" smtClean="0"/>
+              <a:rPr lang="en-US"/>
               <a:t>Fourth level</a:t>
             </a:r>
           </a:p>
           <a:p>
             <a:pPr lvl="4"/>
             <a:r>
-              <a:rPr lang="en-US" smtClean="0"/>
+              <a:rPr lang="en-US"/>
               <a:t>Fifth level</a:t>
             </a:r>
-            <a:endParaRPr lang="en-US"/>
           </a:p>
         </p:txBody>
       </p:sp>
@@ -2741,7 +2720,7 @@
           <a:p>
             <a:fld id="{CC04084B-2F15-419C-AA91-DBD329B3D928}" type="datetimeFigureOut">
               <a:rPr lang="en-US" smtClean="0"/>
-              <a:t>7/18/2016</a:t>
+              <a:t>7/18/2019</a:t>
             </a:fld>
             <a:endParaRPr lang="en-US"/>
           </a:p>
@@ -3168,110 +3147,38 @@
           <a:lstStyle/>
           <a:p>
             <a:r>
-              <a:rPr lang="en-US" sz="2800" dirty="0" smtClean="0"/>
-              <a:t>Baskauf, S. and C. O. </a:t>
-            </a:r>
-            <a:r>
               <a:rPr lang="en-US" sz="2800" dirty="0"/>
-              <a:t>Webb. </a:t>
-            </a:r>
-            <a:r>
-              <a:rPr lang="en-US" sz="2800" dirty="0" smtClean="0"/>
-              <a:t>In press. Darwin-SW</a:t>
-            </a:r>
+              <a:t>Baskauf, S. and C. O. Webb. In press. Darwin-SW: Darwin Core-based terms for expressing biodiversity data as RDF. Semantic Web Journal.  http://www.semantic-web-journal.net/content/darwin-sw-darwin-core-based-terms-expressing-biodiversity-data-rdf-1</a:t>
+            </a:r>
+          </a:p>
+          <a:p>
             <a:r>
               <a:rPr lang="en-US" sz="2800" dirty="0"/>
-              <a:t>: Darwin Core-based terms for expressing biodiversity data as </a:t>
-            </a:r>
-            <a:r>
-              <a:rPr lang="en-US" sz="2800" dirty="0" smtClean="0"/>
-              <a:t>RDF. Semantic Web Journal.  http://www.semantic-web-journal.net/content/darwin-sw-darwin-core-based-terms-expressing-biodiversity-data-rdf-1</a:t>
-            </a:r>
-            <a:endParaRPr lang="en-US" sz="2800" dirty="0" smtClean="0"/>
-          </a:p>
-          <a:p>
-            <a:r>
-              <a:rPr lang="en-US" sz="2800" dirty="0" smtClean="0"/>
-              <a:t>Darwin </a:t>
-            </a:r>
-            <a:r>
-              <a:rPr lang="en-US" sz="2800" dirty="0" smtClean="0"/>
-              <a:t>Core RDF Guide </a:t>
-            </a:r>
+              <a:t>Darwin Core RDF Guide from http://rs.tdwg.org/dwc/terms/guides/rdf/index.htm</a:t>
+            </a:r>
+          </a:p>
+          <a:p>
             <a:r>
               <a:rPr lang="en-US" sz="2800" dirty="0"/>
-              <a:t>from http://rs.tdwg.org/dwc/terms/guides/rdf/index.htm</a:t>
-            </a:r>
-            <a:endParaRPr lang="en-US" sz="2800" dirty="0" smtClean="0"/>
-          </a:p>
-          <a:p>
-            <a:r>
-              <a:rPr lang="en-US" sz="2800" dirty="0" smtClean="0"/>
-              <a:t>Describing </a:t>
-            </a:r>
+              <a:t>Describing Taxon Concepts from http://code.google.com/p/tdwg-rdf/wiki/TaxonInRDF which is based on the TDWG TaxonConcept Ontology http://code.google.com/p/tdwg-ontology/source/browse/trunk/ontology/voc/TaxonConcept.rdf</a:t>
+            </a:r>
+          </a:p>
+          <a:p>
             <a:r>
               <a:rPr lang="en-US" sz="2800" dirty="0"/>
-              <a:t>Taxon Concepts from http://</a:t>
-            </a:r>
-            <a:r>
-              <a:rPr lang="en-US" sz="2800" dirty="0" smtClean="0"/>
-              <a:t>code.google.com/p/tdwg-rdf/wiki/TaxonInRDF which is based on the TDWG TaxonConcept</a:t>
-            </a:r>
+              <a:t> which is based on the TCS Standard http://www.tdwg.org/standards/117/</a:t>
+            </a:r>
+          </a:p>
+          <a:p>
             <a:r>
               <a:rPr lang="en-US" sz="2800" dirty="0"/>
-              <a:t> Ontology http://</a:t>
-            </a:r>
-            <a:r>
-              <a:rPr lang="en-US" sz="2800" dirty="0" smtClean="0"/>
-              <a:t>code.google.com/p/tdwg-ontology/source/browse/trunk/ontology/voc/TaxonConcept.rdf</a:t>
-            </a:r>
-          </a:p>
-          <a:p>
-            <a:r>
-              <a:rPr lang="en-US" sz="2800" dirty="0" smtClean="0"/>
-              <a:t> which is based on the </a:t>
-            </a:r>
+              <a:t>Darwin-SW version 1.0 from https://github.com/darwin-sw/dsw</a:t>
+            </a:r>
+          </a:p>
+          <a:p>
             <a:r>
               <a:rPr lang="en-US" sz="2800" dirty="0"/>
-              <a:t>TCS Standard http://www.tdwg.org/standards/117/</a:t>
-            </a:r>
-            <a:endParaRPr lang="en-US" sz="2800" dirty="0" smtClean="0"/>
-          </a:p>
-          <a:p>
-            <a:r>
-              <a:rPr lang="en-US" sz="2800" dirty="0" smtClean="0"/>
-              <a:t>Darwin-SW version </a:t>
-            </a:r>
-            <a:r>
-              <a:rPr lang="en-US" sz="2800" dirty="0" smtClean="0"/>
-              <a:t>1.0</a:t>
-            </a:r>
-            <a:r>
-              <a:rPr lang="en-US" sz="2800" dirty="0" smtClean="0"/>
-              <a:t> </a:t>
-            </a:r>
-            <a:r>
-              <a:rPr lang="en-US" sz="2800" dirty="0" smtClean="0"/>
-              <a:t>from </a:t>
-            </a:r>
-            <a:r>
-              <a:rPr lang="en-US" sz="2800" dirty="0"/>
-              <a:t>https://github.com/darwin-sw/dsw</a:t>
-            </a:r>
-            <a:endParaRPr lang="en-US" sz="2800" dirty="0" smtClean="0"/>
-          </a:p>
-          <a:p>
-            <a:r>
-              <a:rPr lang="en-US" sz="2800" dirty="0"/>
-              <a:t>The Association of Systematics Collections (ASC</a:t>
-            </a:r>
-            <a:r>
-              <a:rPr lang="en-US" sz="2800" dirty="0" smtClean="0"/>
-              <a:t>) </a:t>
-            </a:r>
-            <a:r>
-              <a:rPr lang="en-US" sz="2800" dirty="0"/>
-              <a:t>report on: An Information Model for Biological Collections </a:t>
+              <a:t>The Association of Systematics Collections (ASC) report on: An Information Model for Biological Collections </a:t>
             </a:r>
           </a:p>
           <a:p>
@@ -3282,12 +3189,8 @@
           </a:p>
           <a:p>
             <a:r>
-              <a:rPr lang="en-US" sz="2800" dirty="0" smtClean="0"/>
-              <a:t>ASC model diagram from http</a:t>
-            </a:r>
-            <a:r>
               <a:rPr lang="en-US" sz="2800" dirty="0"/>
-              <a:t>://wiki.tdwg.org/twiki/bin/viewfile/TAG/HistoricalDocuments?rev=1;filename=Ascfig2.pdf</a:t>
+              <a:t>ASC model diagram from http://wiki.tdwg.org/twiki/bin/viewfile/TAG/HistoricalDocuments?rev=1;filename=Ascfig2.pdf</a:t>
             </a:r>
           </a:p>
         </p:txBody>
@@ -3677,7 +3580,7 @@
           <a:noFill/>
           <a:ln w="63500">
             <a:solidFill>
-              <a:srgbClr val="00B0F0"/>
+              <a:srgbClr val="FF0000"/>
             </a:solidFill>
           </a:ln>
         </p:spPr>
@@ -3884,18 +3787,13 @@
           <a:lstStyle/>
           <a:p>
             <a:r>
-              <a:rPr lang="en-US" sz="3600" b="1" dirty="0" smtClean="0">
+              <a:rPr lang="en-US" sz="3600" b="1" dirty="0">
                 <a:solidFill>
                   <a:srgbClr val="FF0000"/>
                 </a:solidFill>
               </a:rPr>
               <a:t>dcterms:Location</a:t>
             </a:r>
-            <a:endParaRPr lang="en-US" sz="3600" b="1" dirty="0">
-              <a:solidFill>
-                <a:srgbClr val="FF0000"/>
-              </a:solidFill>
-            </a:endParaRPr>
           </a:p>
         </p:txBody>
       </p:sp>
@@ -3922,7 +3820,7 @@
           <a:lstStyle/>
           <a:p>
             <a:r>
-              <a:rPr lang="en-US" sz="3600" b="1" dirty="0" smtClean="0">
+              <a:rPr lang="en-US" sz="3600" b="1" dirty="0">
                 <a:solidFill>
                   <a:srgbClr val="00B0F0"/>
                 </a:solidFill>
@@ -3932,18 +3830,13 @@
           </a:p>
           <a:p>
             <a:r>
-              <a:rPr lang="en-US" sz="3600" b="1" dirty="0" smtClean="0">
+              <a:rPr lang="en-US" sz="3600" b="1" dirty="0">
                 <a:solidFill>
                   <a:srgbClr val="00B0F0"/>
                 </a:solidFill>
               </a:rPr>
               <a:t>dcterms:Agent</a:t>
             </a:r>
-            <a:endParaRPr lang="en-US" sz="3600" b="1" dirty="0">
-              <a:solidFill>
-                <a:srgbClr val="00B0F0"/>
-              </a:solidFill>
-            </a:endParaRPr>
           </a:p>
         </p:txBody>
       </p:sp>
@@ -3970,7 +3863,7 @@
           <a:lstStyle/>
           <a:p>
             <a:r>
-              <a:rPr lang="en-US" sz="3600" b="1" dirty="0" smtClean="0">
+              <a:rPr lang="en-US" sz="3600" b="1" dirty="0">
                 <a:solidFill>
                   <a:srgbClr val="00B0F0"/>
                 </a:solidFill>
@@ -3980,18 +3873,13 @@
           </a:p>
           <a:p>
             <a:r>
-              <a:rPr lang="en-US" sz="3600" b="1" dirty="0" smtClean="0">
+              <a:rPr lang="en-US" sz="3600" b="1" dirty="0">
                 <a:solidFill>
                   <a:srgbClr val="00B0F0"/>
                 </a:solidFill>
               </a:rPr>
               <a:t>dcterms:Agent</a:t>
             </a:r>
-            <a:endParaRPr lang="en-US" sz="3600" b="1" dirty="0">
-              <a:solidFill>
-                <a:srgbClr val="00B0F0"/>
-              </a:solidFill>
-            </a:endParaRPr>
           </a:p>
         </p:txBody>
       </p:sp>
@@ -4018,18 +3906,13 @@
           <a:lstStyle/>
           <a:p>
             <a:r>
-              <a:rPr lang="en-US" sz="3600" b="1" dirty="0" smtClean="0">
+              <a:rPr lang="en-US" sz="3600" b="1" dirty="0">
                 <a:solidFill>
                   <a:srgbClr val="00B0F0"/>
                 </a:solidFill>
               </a:rPr>
               <a:t>gn:Feature</a:t>
             </a:r>
-            <a:endParaRPr lang="en-US" sz="3600" b="1" dirty="0">
-              <a:solidFill>
-                <a:srgbClr val="00B0F0"/>
-              </a:solidFill>
-            </a:endParaRPr>
           </a:p>
         </p:txBody>
       </p:sp>
@@ -4056,18 +3939,13 @@
           <a:lstStyle/>
           <a:p>
             <a:r>
-              <a:rPr lang="en-US" sz="3600" b="1" i="1" dirty="0" smtClean="0">
+              <a:rPr lang="en-US" sz="3600" b="1" i="1" dirty="0">
                 <a:solidFill>
                   <a:srgbClr val="FF0000"/>
                 </a:solidFill>
               </a:rPr>
               <a:t>dwciri:inDescribedPlace</a:t>
             </a:r>
-            <a:endParaRPr lang="en-US" sz="3600" b="1" i="1" dirty="0">
-              <a:solidFill>
-                <a:srgbClr val="FF0000"/>
-              </a:solidFill>
-            </a:endParaRPr>
           </a:p>
         </p:txBody>
       </p:sp>
@@ -4094,7 +3972,7 @@
           <a:lstStyle/>
           <a:p>
             <a:r>
-              <a:rPr lang="en-US" sz="3600" b="1" i="1" dirty="0" smtClean="0">
+              <a:rPr lang="en-US" sz="3600" b="1" i="1" dirty="0">
                 <a:solidFill>
                   <a:srgbClr val="FFC000"/>
                 </a:solidFill>
@@ -4102,7 +3980,7 @@
               <a:t>dsw:locatedAt</a:t>
             </a:r>
             <a:r>
-              <a:rPr lang="en-US" sz="3600" b="1" i="1" dirty="0" smtClean="0">
+              <a:rPr lang="en-US" sz="3600" b="1" i="1" dirty="0">
                 <a:solidFill>
                   <a:srgbClr val="FFC000"/>
                 </a:solidFill>
@@ -4110,7 +3988,7 @@
               </a:rPr>
               <a:t></a:t>
             </a:r>
-            <a:endParaRPr lang="en-US" sz="3600" b="1" i="1" dirty="0" smtClean="0">
+            <a:endParaRPr lang="en-US" sz="3600" b="1" i="1" dirty="0">
               <a:solidFill>
                 <a:srgbClr val="FFC000"/>
               </a:solidFill>
@@ -4118,7 +3996,7 @@
           </a:p>
           <a:p>
             <a:r>
-              <a:rPr lang="en-US" sz="3600" b="1" i="1" dirty="0" smtClean="0">
+              <a:rPr lang="en-US" sz="3600" b="1" i="1" dirty="0">
                 <a:solidFill>
                   <a:schemeClr val="bg2">
                     <a:lumMod val="75000"/>
@@ -4129,7 +4007,7 @@
               <a:t></a:t>
             </a:r>
             <a:r>
-              <a:rPr lang="en-US" sz="3600" b="1" i="1" dirty="0" smtClean="0">
+              <a:rPr lang="en-US" sz="3600" b="1" i="1" dirty="0">
                 <a:solidFill>
                   <a:schemeClr val="bg2">
                     <a:lumMod val="75000"/>
@@ -4138,13 +4016,6 @@
               </a:rPr>
               <a:t>dsw:locates</a:t>
             </a:r>
-            <a:endParaRPr lang="en-US" sz="3600" b="1" i="1" dirty="0">
-              <a:solidFill>
-                <a:schemeClr val="bg2">
-                  <a:lumMod val="75000"/>
-                </a:schemeClr>
-              </a:solidFill>
-            </a:endParaRPr>
           </a:p>
         </p:txBody>
       </p:sp>
@@ -4171,18 +4042,13 @@
           <a:lstStyle/>
           <a:p>
             <a:r>
-              <a:rPr lang="en-US" sz="3600" b="1" dirty="0" smtClean="0">
+              <a:rPr lang="en-US" sz="3600" b="1" dirty="0">
                 <a:solidFill>
                   <a:srgbClr val="FF0000"/>
                 </a:solidFill>
               </a:rPr>
               <a:t>dwc:Event</a:t>
             </a:r>
-            <a:endParaRPr lang="en-US" sz="3600" b="1" dirty="0">
-              <a:solidFill>
-                <a:srgbClr val="FF0000"/>
-              </a:solidFill>
-            </a:endParaRPr>
           </a:p>
         </p:txBody>
       </p:sp>
@@ -4209,18 +4075,13 @@
           <a:lstStyle/>
           <a:p>
             <a:r>
-              <a:rPr lang="en-US" sz="3600" b="1" i="1" dirty="0" smtClean="0">
+              <a:rPr lang="en-US" sz="3600" b="1" i="1" dirty="0">
                 <a:solidFill>
                   <a:srgbClr val="FF0000"/>
                 </a:solidFill>
               </a:rPr>
               <a:t>dwciri:recordedBy</a:t>
             </a:r>
-            <a:endParaRPr lang="en-US" sz="3600" b="1" i="1" dirty="0">
-              <a:solidFill>
-                <a:srgbClr val="FF0000"/>
-              </a:solidFill>
-            </a:endParaRPr>
           </a:p>
         </p:txBody>
       </p:sp>
@@ -4333,7 +4194,7 @@
           <a:lstStyle/>
           <a:p>
             <a:r>
-              <a:rPr lang="en-US" sz="3600" b="1" i="1" dirty="0" smtClean="0">
+              <a:rPr lang="en-US" sz="3600" b="1" i="1" dirty="0">
                 <a:solidFill>
                   <a:srgbClr val="FFC000"/>
                 </a:solidFill>
@@ -4341,7 +4202,7 @@
               <a:t>dsw:atEvent</a:t>
             </a:r>
             <a:r>
-              <a:rPr lang="en-US" sz="3600" b="1" i="1" dirty="0" smtClean="0">
+              <a:rPr lang="en-US" sz="3600" b="1" i="1" dirty="0">
                 <a:solidFill>
                   <a:srgbClr val="FFC000"/>
                 </a:solidFill>
@@ -4349,7 +4210,7 @@
               </a:rPr>
               <a:t></a:t>
             </a:r>
-            <a:endParaRPr lang="en-US" sz="3600" b="1" i="1" dirty="0" smtClean="0">
+            <a:endParaRPr lang="en-US" sz="3600" b="1" i="1" dirty="0">
               <a:solidFill>
                 <a:srgbClr val="FFC000"/>
               </a:solidFill>
@@ -4357,7 +4218,7 @@
           </a:p>
           <a:p>
             <a:r>
-              <a:rPr lang="en-US" sz="3600" b="1" i="1" dirty="0" smtClean="0">
+              <a:rPr lang="en-US" sz="3600" b="1" i="1" dirty="0">
                 <a:solidFill>
                   <a:schemeClr val="bg2">
                     <a:lumMod val="75000"/>
@@ -4368,7 +4229,7 @@
               <a:t></a:t>
             </a:r>
             <a:r>
-              <a:rPr lang="en-US" sz="3600" b="1" i="1" dirty="0" smtClean="0">
+              <a:rPr lang="en-US" sz="3600" b="1" i="1" dirty="0">
                 <a:solidFill>
                   <a:schemeClr val="bg2">
                     <a:lumMod val="75000"/>
@@ -4377,13 +4238,6 @@
               </a:rPr>
               <a:t>dsw:eventOf</a:t>
             </a:r>
-            <a:endParaRPr lang="en-US" sz="3600" b="1" i="1" dirty="0">
-              <a:solidFill>
-                <a:schemeClr val="bg2">
-                  <a:lumMod val="75000"/>
-                </a:schemeClr>
-              </a:solidFill>
-            </a:endParaRPr>
           </a:p>
         </p:txBody>
       </p:sp>
@@ -4410,18 +4264,13 @@
           <a:lstStyle/>
           <a:p>
             <a:r>
-              <a:rPr lang="en-US" sz="3600" b="1" dirty="0" smtClean="0">
+              <a:rPr lang="en-US" sz="3600" b="1" dirty="0">
                 <a:solidFill>
                   <a:srgbClr val="FF0000"/>
                 </a:solidFill>
               </a:rPr>
               <a:t>dwc:Occurrence</a:t>
             </a:r>
-            <a:endParaRPr lang="en-US" sz="3600" b="1" dirty="0">
-              <a:solidFill>
-                <a:srgbClr val="FF0000"/>
-              </a:solidFill>
-            </a:endParaRPr>
           </a:p>
         </p:txBody>
       </p:sp>
@@ -4487,7 +4336,7 @@
           <a:lstStyle/>
           <a:p>
             <a:r>
-              <a:rPr lang="en-US" sz="3600" b="1" i="1" dirty="0" smtClean="0">
+              <a:rPr lang="en-US" sz="3600" b="1" i="1" dirty="0">
                 <a:solidFill>
                   <a:srgbClr val="FFC000"/>
                 </a:solidFill>
@@ -4495,7 +4344,7 @@
               <a:t>dsw:evidenceFor</a:t>
             </a:r>
             <a:r>
-              <a:rPr lang="en-US" sz="3600" b="1" i="1" dirty="0" smtClean="0">
+              <a:rPr lang="en-US" sz="3600" b="1" i="1" dirty="0">
                 <a:solidFill>
                   <a:srgbClr val="FFC000"/>
                 </a:solidFill>
@@ -4503,7 +4352,7 @@
               </a:rPr>
               <a:t></a:t>
             </a:r>
-            <a:endParaRPr lang="en-US" sz="3600" b="1" i="1" dirty="0" smtClean="0">
+            <a:endParaRPr lang="en-US" sz="3600" b="1" i="1" dirty="0">
               <a:solidFill>
                 <a:srgbClr val="FFC000"/>
               </a:solidFill>
@@ -4511,7 +4360,7 @@
           </a:p>
           <a:p>
             <a:r>
-              <a:rPr lang="en-US" sz="3600" b="1" i="1" dirty="0" smtClean="0">
+              <a:rPr lang="en-US" sz="3600" b="1" i="1" dirty="0">
                 <a:solidFill>
                   <a:schemeClr val="bg2">
                     <a:lumMod val="75000"/>
@@ -4522,7 +4371,7 @@
               <a:t></a:t>
             </a:r>
             <a:r>
-              <a:rPr lang="en-US" sz="3600" b="1" i="1" dirty="0" smtClean="0">
+              <a:rPr lang="en-US" sz="3600" b="1" i="1" dirty="0">
                 <a:solidFill>
                   <a:schemeClr val="bg2">
                     <a:lumMod val="75000"/>
@@ -4531,13 +4380,6 @@
               </a:rPr>
               <a:t>dsw:hasEvidence</a:t>
             </a:r>
-            <a:endParaRPr lang="en-US" sz="3600" b="1" i="1" dirty="0">
-              <a:solidFill>
-                <a:schemeClr val="bg2">
-                  <a:lumMod val="75000"/>
-                </a:schemeClr>
-              </a:solidFill>
-            </a:endParaRPr>
           </a:p>
         </p:txBody>
       </p:sp>
@@ -4564,18 +4406,13 @@
           <a:lstStyle/>
           <a:p>
             <a:r>
-              <a:rPr lang="en-US" sz="3600" b="1" dirty="0" smtClean="0">
+              <a:rPr lang="en-US" sz="3600" b="1" dirty="0">
                 <a:solidFill>
                   <a:srgbClr val="FFC000"/>
                 </a:solidFill>
               </a:rPr>
               <a:t>dsw:Token</a:t>
             </a:r>
-            <a:endParaRPr lang="en-US" sz="3600" b="1" dirty="0">
-              <a:solidFill>
-                <a:srgbClr val="FFC000"/>
-              </a:solidFill>
-            </a:endParaRPr>
           </a:p>
         </p:txBody>
       </p:sp>
@@ -4648,18 +4485,13 @@
           <a:lstStyle/>
           <a:p>
             <a:r>
-              <a:rPr lang="en-US" sz="3600" b="1" dirty="0" smtClean="0">
+              <a:rPr lang="en-US" sz="3600" b="1" dirty="0">
                 <a:solidFill>
                   <a:srgbClr val="FF0000"/>
                 </a:solidFill>
               </a:rPr>
               <a:t>rdfs:Literal</a:t>
             </a:r>
-            <a:endParaRPr lang="en-US" sz="3600" b="1" dirty="0">
-              <a:solidFill>
-                <a:srgbClr val="FF0000"/>
-              </a:solidFill>
-            </a:endParaRPr>
           </a:p>
         </p:txBody>
       </p:sp>
@@ -4686,18 +4518,13 @@
           <a:lstStyle/>
           <a:p>
             <a:r>
-              <a:rPr lang="en-US" sz="3600" b="1" i="1" dirty="0" smtClean="0">
+              <a:rPr lang="en-US" sz="3600" b="1" i="1" dirty="0">
                 <a:solidFill>
                   <a:srgbClr val="FF0000"/>
                 </a:solidFill>
               </a:rPr>
               <a:t>dwc:eventDate</a:t>
             </a:r>
-            <a:endParaRPr lang="en-US" sz="3600" b="1" i="1" dirty="0">
-              <a:solidFill>
-                <a:srgbClr val="FF0000"/>
-              </a:solidFill>
-            </a:endParaRPr>
           </a:p>
         </p:txBody>
       </p:sp>
@@ -4724,18 +4551,13 @@
           <a:lstStyle/>
           <a:p>
             <a:r>
-              <a:rPr lang="en-US" sz="3600" b="1" dirty="0" smtClean="0">
+              <a:rPr lang="en-US" sz="3600" b="1" dirty="0">
                 <a:solidFill>
                   <a:srgbClr val="FF0000"/>
                 </a:solidFill>
               </a:rPr>
               <a:t>dwc:Identification</a:t>
             </a:r>
-            <a:endParaRPr lang="en-US" sz="3600" b="1" dirty="0">
-              <a:solidFill>
-                <a:srgbClr val="FF0000"/>
-              </a:solidFill>
-            </a:endParaRPr>
           </a:p>
         </p:txBody>
       </p:sp>
@@ -4847,18 +4669,13 @@
           <a:lstStyle/>
           <a:p>
             <a:r>
-              <a:rPr lang="en-US" sz="3600" b="1" i="1" dirty="0" smtClean="0">
+              <a:rPr lang="en-US" sz="3600" b="1" i="1" dirty="0">
                 <a:solidFill>
                   <a:srgbClr val="FF0000"/>
                 </a:solidFill>
               </a:rPr>
               <a:t>dwciri:toTaxon</a:t>
             </a:r>
-            <a:endParaRPr lang="en-US" sz="3600" b="1" i="1" dirty="0">
-              <a:solidFill>
-                <a:srgbClr val="FF0000"/>
-              </a:solidFill>
-            </a:endParaRPr>
           </a:p>
         </p:txBody>
       </p:sp>
@@ -4962,18 +4779,13 @@
           <a:lstStyle/>
           <a:p>
             <a:r>
-              <a:rPr lang="en-US" sz="3600" b="1" i="1" dirty="0" smtClean="0">
+              <a:rPr lang="en-US" sz="3600" b="1" i="1" dirty="0">
                 <a:solidFill>
                   <a:srgbClr val="00B0F0"/>
                 </a:solidFill>
               </a:rPr>
               <a:t>dcterms:creator</a:t>
             </a:r>
-            <a:endParaRPr lang="en-US" sz="3600" b="1" i="1" dirty="0">
-              <a:solidFill>
-                <a:srgbClr val="00B0F0"/>
-              </a:solidFill>
-            </a:endParaRPr>
           </a:p>
         </p:txBody>
       </p:sp>
@@ -5000,18 +4812,13 @@
           <a:lstStyle/>
           <a:p>
             <a:r>
-              <a:rPr lang="en-US" sz="3600" b="1" i="1" dirty="0" smtClean="0">
+              <a:rPr lang="en-US" sz="3600" b="1" i="1" dirty="0">
                 <a:solidFill>
                   <a:srgbClr val="00B0F0"/>
                 </a:solidFill>
               </a:rPr>
               <a:t>tc:accordingTo</a:t>
             </a:r>
-            <a:endParaRPr lang="en-US" sz="3600" b="1" i="1" dirty="0">
-              <a:solidFill>
-                <a:srgbClr val="00B0F0"/>
-              </a:solidFill>
-            </a:endParaRPr>
           </a:p>
         </p:txBody>
       </p:sp>
@@ -5077,18 +4884,13 @@
           <a:lstStyle/>
           <a:p>
             <a:r>
-              <a:rPr lang="en-US" sz="3600" b="1" i="1" dirty="0" smtClean="0">
+              <a:rPr lang="en-US" sz="3600" b="1" i="1" dirty="0">
                 <a:solidFill>
                   <a:srgbClr val="00B0F0"/>
                 </a:solidFill>
               </a:rPr>
               <a:t>tc:hasName</a:t>
             </a:r>
-            <a:endParaRPr lang="en-US" sz="3600" b="1" i="1" dirty="0">
-              <a:solidFill>
-                <a:srgbClr val="00B0F0"/>
-              </a:solidFill>
-            </a:endParaRPr>
           </a:p>
         </p:txBody>
       </p:sp>
@@ -5115,7 +4917,7 @@
           <a:lstStyle/>
           <a:p>
             <a:r>
-              <a:rPr lang="en-US" sz="3600" b="1" dirty="0" smtClean="0">
+              <a:rPr lang="en-US" sz="3600" b="1" dirty="0">
                 <a:solidFill>
                   <a:srgbClr val="00B0F0"/>
                 </a:solidFill>
@@ -5148,26 +4950,13 @@
           <a:lstStyle/>
           <a:p>
             <a:r>
-              <a:rPr lang="en-US" sz="3600" b="1" dirty="0" smtClean="0">
-                <a:solidFill>
-                  <a:srgbClr val="00B0F0"/>
-                </a:solidFill>
-              </a:rPr>
-              <a:t>dwc</a:t>
-            </a:r>
-            <a:r>
-              <a:rPr lang="en-US" sz="3600" b="1" dirty="0" smtClean="0">
-                <a:solidFill>
-                  <a:srgbClr val="00B0F0"/>
-                </a:solidFill>
-              </a:rPr>
-              <a:t>:Taxon</a:t>
-            </a:r>
-            <a:endParaRPr lang="en-US" sz="3600" b="1" dirty="0" smtClean="0">
-              <a:solidFill>
-                <a:srgbClr val="00B0F0"/>
-              </a:solidFill>
-            </a:endParaRPr>
+              <a:rPr lang="en-US" sz="3600" b="1" dirty="0">
+                <a:solidFill>
+                  <a:srgbClr val="FF0000"/>
+                </a:solidFill>
+              </a:rPr>
+              <a:t>dwc:Taxon</a:t>
+            </a:r>
           </a:p>
         </p:txBody>
       </p:sp>
@@ -5194,7 +4983,7 @@
           <a:lstStyle/>
           <a:p>
             <a:r>
-              <a:rPr lang="en-US" sz="3600" b="1" dirty="0" smtClean="0">
+              <a:rPr lang="en-US" sz="3600" b="1" dirty="0">
                 <a:solidFill>
                   <a:srgbClr val="00B0F0"/>
                 </a:solidFill>
@@ -5227,18 +5016,13 @@
           <a:lstStyle/>
           <a:p>
             <a:r>
-              <a:rPr lang="en-US" sz="3600" b="1" dirty="0" smtClean="0">
+              <a:rPr lang="en-US" sz="3600" b="1" dirty="0">
                 <a:solidFill>
                   <a:srgbClr val="FF0000"/>
                 </a:solidFill>
               </a:rPr>
               <a:t>dwc:Organism</a:t>
             </a:r>
-            <a:endParaRPr lang="en-US" sz="3600" b="1" dirty="0">
-              <a:solidFill>
-                <a:srgbClr val="FF0000"/>
-              </a:solidFill>
-            </a:endParaRPr>
           </a:p>
         </p:txBody>
       </p:sp>
@@ -5350,7 +5134,7 @@
           <a:lstStyle/>
           <a:p>
             <a:r>
-              <a:rPr lang="en-US" sz="3600" b="1" i="1" dirty="0" smtClean="0">
+              <a:rPr lang="en-US" sz="3600" b="1" i="1" dirty="0">
                 <a:solidFill>
                   <a:schemeClr val="bg2">
                     <a:lumMod val="75000"/>
@@ -5360,7 +5144,7 @@
               <a:t>dsw:hasOccurrence</a:t>
             </a:r>
             <a:r>
-              <a:rPr lang="en-US" sz="3600" b="1" i="1" dirty="0" smtClean="0">
+              <a:rPr lang="en-US" sz="3600" b="1" i="1" dirty="0">
                 <a:solidFill>
                   <a:schemeClr val="bg2">
                     <a:lumMod val="75000"/>
@@ -5370,7 +5154,7 @@
               </a:rPr>
               <a:t></a:t>
             </a:r>
-            <a:endParaRPr lang="en-US" sz="3600" b="1" i="1" dirty="0" smtClean="0">
+            <a:endParaRPr lang="en-US" sz="3600" b="1" i="1" dirty="0">
               <a:solidFill>
                 <a:schemeClr val="bg2">
                   <a:lumMod val="75000"/>
@@ -5380,7 +5164,7 @@
           </a:p>
           <a:p>
             <a:r>
-              <a:rPr lang="en-US" sz="3600" b="1" i="1" dirty="0" smtClean="0">
+              <a:rPr lang="en-US" sz="3600" b="1" i="1" dirty="0">
                 <a:solidFill>
                   <a:srgbClr val="FFC000"/>
                 </a:solidFill>
@@ -5389,18 +5173,13 @@
               <a:t></a:t>
             </a:r>
             <a:r>
-              <a:rPr lang="en-US" sz="3600" b="1" i="1" dirty="0" smtClean="0">
+              <a:rPr lang="en-US" sz="3600" b="1" i="1" dirty="0">
                 <a:solidFill>
                   <a:srgbClr val="FFC000"/>
                 </a:solidFill>
               </a:rPr>
               <a:t>dsw:occurrenceOf</a:t>
             </a:r>
-            <a:endParaRPr lang="en-US" sz="3600" b="1" i="1" dirty="0">
-              <a:solidFill>
-                <a:srgbClr val="FFC000"/>
-              </a:solidFill>
-            </a:endParaRPr>
           </a:p>
         </p:txBody>
       </p:sp>
@@ -5467,7 +5246,7 @@
           <a:lstStyle/>
           <a:p>
             <a:r>
-              <a:rPr lang="en-US" sz="3600" b="1" i="1" dirty="0" smtClean="0">
+              <a:rPr lang="en-US" sz="3600" b="1" i="1" dirty="0">
                 <a:solidFill>
                   <a:schemeClr val="bg2">
                     <a:lumMod val="75000"/>
@@ -5477,7 +5256,7 @@
               <a:t>dsw:hasIdentification</a:t>
             </a:r>
             <a:r>
-              <a:rPr lang="en-US" sz="3600" b="1" i="1" dirty="0" smtClean="0">
+              <a:rPr lang="en-US" sz="3600" b="1" i="1" dirty="0">
                 <a:solidFill>
                   <a:schemeClr val="bg2">
                     <a:lumMod val="75000"/>
@@ -5487,7 +5266,7 @@
               </a:rPr>
               <a:t></a:t>
             </a:r>
-            <a:endParaRPr lang="en-US" sz="3600" b="1" i="1" dirty="0" smtClean="0">
+            <a:endParaRPr lang="en-US" sz="3600" b="1" i="1" dirty="0">
               <a:solidFill>
                 <a:schemeClr val="bg2">
                   <a:lumMod val="75000"/>
@@ -5497,7 +5276,7 @@
           </a:p>
           <a:p>
             <a:r>
-              <a:rPr lang="en-US" sz="3600" b="1" i="1" dirty="0" smtClean="0">
+              <a:rPr lang="en-US" sz="3600" b="1" i="1" dirty="0">
                 <a:solidFill>
                   <a:srgbClr val="FFC000"/>
                 </a:solidFill>
@@ -5506,18 +5285,13 @@
               <a:t></a:t>
             </a:r>
             <a:r>
-              <a:rPr lang="en-US" sz="3600" b="1" i="1" dirty="0" smtClean="0">
+              <a:rPr lang="en-US" sz="3600" b="1" i="1" dirty="0">
                 <a:solidFill>
                   <a:srgbClr val="FFC000"/>
                 </a:solidFill>
               </a:rPr>
               <a:t>dsw:identifies</a:t>
             </a:r>
-            <a:endParaRPr lang="en-US" sz="3600" b="1" i="1" dirty="0">
-              <a:solidFill>
-                <a:srgbClr val="FFC000"/>
-              </a:solidFill>
-            </a:endParaRPr>
           </a:p>
         </p:txBody>
       </p:sp>
@@ -5584,7 +5358,7 @@
           <a:lstStyle/>
           <a:p>
             <a:r>
-              <a:rPr lang="en-US" sz="2800" b="1" i="1" dirty="0" smtClean="0">
+              <a:rPr lang="en-US" sz="2800" b="1" i="1" dirty="0">
                 <a:solidFill>
                   <a:schemeClr val="bg2">
                     <a:lumMod val="75000"/>
@@ -5594,7 +5368,7 @@
               <a:t>dsw:idBasedOn</a:t>
             </a:r>
             <a:r>
-              <a:rPr lang="en-US" sz="2800" b="1" i="1" dirty="0" smtClean="0">
+              <a:rPr lang="en-US" sz="2800" b="1" i="1" dirty="0">
                 <a:solidFill>
                   <a:schemeClr val="bg2">
                     <a:lumMod val="75000"/>
@@ -5604,7 +5378,7 @@
               </a:rPr>
               <a:t></a:t>
             </a:r>
-            <a:endParaRPr lang="en-US" sz="2800" b="1" i="1" dirty="0" smtClean="0">
+            <a:endParaRPr lang="en-US" sz="2800" b="1" i="1" dirty="0">
               <a:solidFill>
                 <a:schemeClr val="bg2">
                   <a:lumMod val="75000"/>
@@ -5614,7 +5388,7 @@
           </a:p>
           <a:p>
             <a:r>
-              <a:rPr lang="en-US" sz="2800" b="1" i="1" dirty="0" smtClean="0">
+              <a:rPr lang="en-US" sz="2800" b="1" i="1" dirty="0">
                 <a:solidFill>
                   <a:srgbClr val="FFC000"/>
                 </a:solidFill>
@@ -5623,18 +5397,13 @@
               <a:t></a:t>
             </a:r>
             <a:r>
-              <a:rPr lang="en-US" sz="2800" b="1" i="1" dirty="0" smtClean="0">
+              <a:rPr lang="en-US" sz="2800" b="1" i="1" dirty="0">
                 <a:solidFill>
                   <a:srgbClr val="FFC000"/>
                 </a:solidFill>
               </a:rPr>
               <a:t>dsw:isBasisForId</a:t>
             </a:r>
-            <a:endParaRPr lang="en-US" sz="2800" b="1" i="1" dirty="0">
-              <a:solidFill>
-                <a:srgbClr val="FFC000"/>
-              </a:solidFill>
-            </a:endParaRPr>
           </a:p>
         </p:txBody>
       </p:sp>
@@ -5701,7 +5470,7 @@
           <a:lstStyle/>
           <a:p>
             <a:r>
-              <a:rPr lang="en-US" sz="3600" b="1" i="1" dirty="0" smtClean="0">
+              <a:rPr lang="en-US" sz="3600" b="1" i="1" dirty="0">
                 <a:solidFill>
                   <a:schemeClr val="bg2">
                     <a:lumMod val="75000"/>
@@ -5711,7 +5480,7 @@
               <a:t>dsw:hasDerivative</a:t>
             </a:r>
             <a:r>
-              <a:rPr lang="en-US" sz="3600" b="1" i="1" dirty="0" smtClean="0">
+              <a:rPr lang="en-US" sz="3600" b="1" i="1" dirty="0">
                 <a:solidFill>
                   <a:schemeClr val="bg2">
                     <a:lumMod val="75000"/>
@@ -5721,7 +5490,7 @@
               </a:rPr>
               <a:t></a:t>
             </a:r>
-            <a:endParaRPr lang="en-US" sz="3600" b="1" i="1" dirty="0" smtClean="0">
+            <a:endParaRPr lang="en-US" sz="3600" b="1" i="1" dirty="0">
               <a:solidFill>
                 <a:schemeClr val="bg2">
                   <a:lumMod val="75000"/>
@@ -5731,7 +5500,7 @@
           </a:p>
           <a:p>
             <a:r>
-              <a:rPr lang="en-US" sz="3600" b="1" i="1" dirty="0" smtClean="0">
+              <a:rPr lang="en-US" sz="3600" b="1" i="1" dirty="0">
                 <a:solidFill>
                   <a:srgbClr val="FFC000"/>
                 </a:solidFill>
@@ -5740,18 +5509,13 @@
               <a:t></a:t>
             </a:r>
             <a:r>
-              <a:rPr lang="en-US" sz="3600" b="1" i="1" dirty="0" smtClean="0">
+              <a:rPr lang="en-US" sz="3600" b="1" i="1" dirty="0">
                 <a:solidFill>
                   <a:srgbClr val="FFC000"/>
                 </a:solidFill>
               </a:rPr>
               <a:t>dsw:derivedFrom</a:t>
             </a:r>
-            <a:endParaRPr lang="en-US" sz="3600" b="1" i="1" dirty="0">
-              <a:solidFill>
-                <a:srgbClr val="FFC000"/>
-              </a:solidFill>
-            </a:endParaRPr>
           </a:p>
         </p:txBody>
       </p:sp>
@@ -5778,10 +5542,9 @@
           <a:lstStyle/>
           <a:p>
             <a:r>
-              <a:rPr lang="en-US" sz="4400" b="1" dirty="0" smtClean="0"/>
+              <a:rPr lang="en-US" sz="4400" b="1" dirty="0"/>
               <a:t>Key:</a:t>
             </a:r>
-            <a:endParaRPr lang="en-US" sz="4400" b="1" dirty="0"/>
           </a:p>
         </p:txBody>
       </p:sp>
@@ -5822,48 +5585,34 @@
             <a:lstStyle/>
             <a:p>
               <a:r>
-                <a:rPr lang="en-US" sz="3600" b="1" i="1" dirty="0" smtClean="0"/>
+                <a:rPr lang="en-US" sz="3600" b="1" i="1" dirty="0"/>
                 <a:t>namespace:property</a:t>
               </a:r>
               <a:r>
-                <a:rPr lang="en-US" sz="3600" b="1" dirty="0" smtClean="0"/>
+                <a:rPr lang="en-US" sz="3600" b="1" dirty="0"/>
                 <a:t>   </a:t>
-              </a:r>
-              <a:r>
-                <a:rPr lang="en-US" sz="3200" dirty="0" smtClean="0">
-                  <a:latin typeface="Courier New" panose="02070309020205020404" pitchFamily="49" charset="0"/>
-                  <a:cs typeface="Courier New" panose="02070309020205020404" pitchFamily="49" charset="0"/>
-                </a:rPr>
-                <a:t>property </a:t>
               </a:r>
               <a:r>
                 <a:rPr lang="en-US" sz="3200" dirty="0">
                   <a:latin typeface="Courier New" panose="02070309020205020404" pitchFamily="49" charset="0"/>
                   <a:cs typeface="Courier New" panose="02070309020205020404" pitchFamily="49" charset="0"/>
                 </a:rPr>
-                <a:t>(</a:t>
-              </a:r>
-              <a:r>
-                <a:rPr lang="en-US" sz="3200" dirty="0" smtClean="0">
-                  <a:latin typeface="Courier New" panose="02070309020205020404" pitchFamily="49" charset="0"/>
-                  <a:cs typeface="Courier New" panose="02070309020205020404" pitchFamily="49" charset="0"/>
-                </a:rPr>
-                <a:t>italicized)</a:t>
+                <a:t>property (italicized)</a:t>
               </a:r>
             </a:p>
             <a:p>
-              <a:endParaRPr lang="en-US" sz="3200" dirty="0" smtClean="0">
+              <a:endParaRPr lang="en-US" sz="3200" dirty="0">
                 <a:latin typeface="Courier New" panose="02070309020205020404" pitchFamily="49" charset="0"/>
                 <a:cs typeface="Courier New" panose="02070309020205020404" pitchFamily="49" charset="0"/>
               </a:endParaRPr>
             </a:p>
             <a:p>
               <a:r>
-                <a:rPr lang="en-US" sz="3600" b="1" dirty="0" smtClean="0"/>
+                <a:rPr lang="en-US" sz="3600" b="1" dirty="0"/>
                 <a:t>namespace: Class         </a:t>
               </a:r>
               <a:r>
-                <a:rPr lang="en-US" sz="3200" dirty="0" smtClean="0">
+                <a:rPr lang="en-US" sz="3200" dirty="0">
                   <a:latin typeface="Courier New" panose="02070309020205020404" pitchFamily="49" charset="0"/>
                   <a:cs typeface="Courier New" panose="02070309020205020404" pitchFamily="49" charset="0"/>
                 </a:rPr>
@@ -5878,7 +5627,7 @@
             </a:p>
             <a:p>
               <a:r>
-                <a:rPr lang="en-US" sz="3200" dirty="0" smtClean="0">
+                <a:rPr lang="en-US" sz="3200" dirty="0">
                   <a:latin typeface="Courier New" panose="02070309020205020404" pitchFamily="49" charset="0"/>
                   <a:cs typeface="Courier New" panose="02070309020205020404" pitchFamily="49" charset="0"/>
                 </a:rPr>
@@ -5886,7 +5635,7 @@
               </a:r>
             </a:p>
             <a:p>
-              <a:endParaRPr lang="en-US" sz="3200" dirty="0" smtClean="0">
+              <a:endParaRPr lang="en-US" sz="3200" dirty="0">
                 <a:latin typeface="Courier New" panose="02070309020205020404" pitchFamily="49" charset="0"/>
                 <a:cs typeface="Courier New" panose="02070309020205020404" pitchFamily="49" charset="0"/>
               </a:endParaRPr>
@@ -5897,30 +5646,12 @@
                   <a:latin typeface="Courier New" panose="02070309020205020404" pitchFamily="49" charset="0"/>
                   <a:cs typeface="Courier New" panose="02070309020205020404" pitchFamily="49" charset="0"/>
                 </a:rPr>
-                <a:t> </a:t>
+                <a:t>                 inverse property pair; arrow </a:t>
               </a:r>
-              <a:r>
-                <a:rPr lang="en-US" sz="3200" dirty="0" smtClean="0">
-                  <a:latin typeface="Courier New" panose="02070309020205020404" pitchFamily="49" charset="0"/>
-                  <a:cs typeface="Courier New" panose="02070309020205020404" pitchFamily="49" charset="0"/>
-                </a:rPr>
-                <a:t>                inverse property pair; </a:t>
-              </a:r>
-              <a:r>
-                <a:rPr lang="en-US" sz="3200" dirty="0">
-                  <a:latin typeface="Courier New" panose="02070309020205020404" pitchFamily="49" charset="0"/>
-                  <a:cs typeface="Courier New" panose="02070309020205020404" pitchFamily="49" charset="0"/>
-                </a:rPr>
-                <a:t>arrow </a:t>
-              </a:r>
-              <a:endParaRPr lang="en-US" sz="3200" dirty="0" smtClean="0">
-                <a:latin typeface="Courier New" panose="02070309020205020404" pitchFamily="49" charset="0"/>
-                <a:cs typeface="Courier New" panose="02070309020205020404" pitchFamily="49" charset="0"/>
-              </a:endParaRPr>
             </a:p>
             <a:p>
               <a:r>
-                <a:rPr lang="en-US" sz="3200" dirty="0" smtClean="0">
+                <a:rPr lang="en-US" sz="3200" dirty="0">
                   <a:latin typeface="Courier New" panose="02070309020205020404" pitchFamily="49" charset="0"/>
                   <a:cs typeface="Courier New" panose="02070309020205020404" pitchFamily="49" charset="0"/>
                 </a:rPr>
@@ -6026,10 +5757,9 @@
           <a:lstStyle/>
           <a:p>
             <a:r>
-              <a:rPr lang="en-US" sz="4400" b="1" dirty="0" smtClean="0"/>
+              <a:rPr lang="en-US" sz="4400" b="1" dirty="0"/>
               <a:t>Colors:</a:t>
             </a:r>
-            <a:endParaRPr lang="en-US" sz="4400" b="1" dirty="0"/>
           </a:p>
         </p:txBody>
       </p:sp>
@@ -6056,46 +5786,11 @@
           <a:lstStyle/>
           <a:p>
             <a:r>
-              <a:rPr lang="en-US" sz="3200" dirty="0" smtClean="0">
-                <a:latin typeface="Courier New" panose="02070309020205020404" pitchFamily="49" charset="0"/>
-                <a:cs typeface="Courier New" panose="02070309020205020404" pitchFamily="49" charset="0"/>
-              </a:rPr>
-              <a:t>                 red=Darwin Core sensu RDF Guide</a:t>
-            </a:r>
-          </a:p>
-          <a:p>
-            <a:endParaRPr lang="en-US" sz="3200" dirty="0" smtClean="0">
-              <a:latin typeface="Courier New" panose="02070309020205020404" pitchFamily="49" charset="0"/>
-              <a:cs typeface="Courier New" panose="02070309020205020404" pitchFamily="49" charset="0"/>
-            </a:endParaRPr>
-          </a:p>
-          <a:p>
-            <a:r>
-              <a:rPr lang="en-US" sz="3600" b="1" dirty="0" smtClean="0"/>
-              <a:t>                                        </a:t>
-            </a:r>
-            <a:r>
-              <a:rPr lang="en-US" sz="3200" dirty="0" smtClean="0">
-                <a:latin typeface="Courier New" panose="02070309020205020404" pitchFamily="49" charset="0"/>
-                <a:cs typeface="Courier New" panose="02070309020205020404" pitchFamily="49" charset="0"/>
-              </a:rPr>
-              <a:t>yellow=Darwin-SW preferred terms</a:t>
-            </a:r>
-          </a:p>
-          <a:p>
-            <a:r>
               <a:rPr lang="en-US" sz="3200" dirty="0">
                 <a:latin typeface="Courier New" panose="02070309020205020404" pitchFamily="49" charset="0"/>
                 <a:cs typeface="Courier New" panose="02070309020205020404" pitchFamily="49" charset="0"/>
               </a:rPr>
-              <a:t> </a:t>
-            </a:r>
-            <a:r>
-              <a:rPr lang="en-US" sz="3200" dirty="0" smtClean="0">
-                <a:latin typeface="Courier New" panose="02070309020205020404" pitchFamily="49" charset="0"/>
-                <a:cs typeface="Courier New" panose="02070309020205020404" pitchFamily="49" charset="0"/>
-              </a:rPr>
-              <a:t>                (non-preferred terms in gray)</a:t>
+              <a:t>                 red=Darwin Core sensu RDF Guide</a:t>
             </a:r>
           </a:p>
           <a:p>
@@ -6106,7 +5801,35 @@
           </a:p>
           <a:p>
             <a:r>
-              <a:rPr lang="en-US" sz="3200" dirty="0" smtClean="0">
+              <a:rPr lang="en-US" sz="3600" b="1" dirty="0"/>
+              <a:t>                                        </a:t>
+            </a:r>
+            <a:r>
+              <a:rPr lang="en-US" sz="3200" dirty="0">
+                <a:latin typeface="Courier New" panose="02070309020205020404" pitchFamily="49" charset="0"/>
+                <a:cs typeface="Courier New" panose="02070309020205020404" pitchFamily="49" charset="0"/>
+              </a:rPr>
+              <a:t>yellow=Darwin-SW preferred terms</a:t>
+            </a:r>
+          </a:p>
+          <a:p>
+            <a:r>
+              <a:rPr lang="en-US" sz="3200" dirty="0">
+                <a:latin typeface="Courier New" panose="02070309020205020404" pitchFamily="49" charset="0"/>
+                <a:cs typeface="Courier New" panose="02070309020205020404" pitchFamily="49" charset="0"/>
+              </a:rPr>
+              <a:t>                 (non-preferred terms in gray)</a:t>
+            </a:r>
+          </a:p>
+          <a:p>
+            <a:endParaRPr lang="en-US" sz="3200" dirty="0">
+              <a:latin typeface="Courier New" panose="02070309020205020404" pitchFamily="49" charset="0"/>
+              <a:cs typeface="Courier New" panose="02070309020205020404" pitchFamily="49" charset="0"/>
+            </a:endParaRPr>
+          </a:p>
+          <a:p>
+            <a:r>
+              <a:rPr lang="en-US" sz="3200" dirty="0">
                 <a:latin typeface="Courier New" panose="02070309020205020404" pitchFamily="49" charset="0"/>
                 <a:cs typeface="Courier New" panose="02070309020205020404" pitchFamily="49" charset="0"/>
               </a:rPr>
@@ -6222,7 +5945,7 @@
           <a:lstStyle/>
           <a:p>
             <a:r>
-              <a:rPr lang="en-US" sz="3600" b="1" dirty="0" smtClean="0">
+              <a:rPr lang="en-US" sz="3600" b="1" dirty="0">
                 <a:solidFill>
                   <a:srgbClr val="00B0F0"/>
                 </a:solidFill>
@@ -6255,7 +5978,7 @@
           <a:lstStyle/>
           <a:p>
             <a:r>
-              <a:rPr lang="en-US" sz="3600" b="1" i="1" dirty="0" smtClean="0">
+              <a:rPr lang="en-US" sz="3600" b="1" i="1" dirty="0">
                 <a:solidFill>
                   <a:srgbClr val="00B0F0"/>
                 </a:solidFill>
@@ -6372,7 +6095,7 @@
           <a:lstStyle/>
           <a:p>
             <a:r>
-              <a:rPr lang="en-US" sz="3600" b="1" dirty="0" smtClean="0">
+              <a:rPr lang="en-US" sz="3600" b="1" dirty="0">
                 <a:solidFill>
                   <a:srgbClr val="FF0000"/>
                 </a:solidFill>
@@ -6405,7 +6128,7 @@
           <a:lstStyle/>
           <a:p>
             <a:r>
-              <a:rPr lang="en-US" sz="3600" b="1" i="1" dirty="0" smtClean="0">
+              <a:rPr lang="en-US" sz="3600" b="1" i="1" dirty="0">
                 <a:solidFill>
                   <a:srgbClr val="FF0000"/>
                 </a:solidFill>
@@ -6522,7 +6245,7 @@
           <a:lstStyle/>
           <a:p>
             <a:r>
-              <a:rPr lang="en-US" sz="3600" b="1" dirty="0" smtClean="0">
+              <a:rPr lang="en-US" sz="3600" b="1" dirty="0">
                 <a:solidFill>
                   <a:srgbClr val="FFC000"/>
                 </a:solidFill>
@@ -6555,7 +6278,7 @@
           <a:lstStyle/>
           <a:p>
             <a:r>
-              <a:rPr lang="en-US" sz="3600" b="1" i="1" dirty="0" smtClean="0">
+              <a:rPr lang="en-US" sz="3600" b="1" i="1" dirty="0">
                 <a:solidFill>
                   <a:srgbClr val="FFC000"/>
                 </a:solidFill>
@@ -6588,10 +6311,9 @@
           <a:lstStyle/>
           <a:p>
             <a:r>
-              <a:rPr lang="en-US" sz="4400" b="1" dirty="0" smtClean="0"/>
+              <a:rPr lang="en-US" sz="4400" b="1" dirty="0"/>
               <a:t>Namespace abbreviations:</a:t>
             </a:r>
-            <a:endParaRPr lang="en-US" sz="4400" b="1" dirty="0"/>
           </a:p>
         </p:txBody>
       </p:sp>
@@ -6618,313 +6340,144 @@
           <a:lstStyle/>
           <a:p>
             <a:r>
-              <a:rPr lang="en-US" sz="3200" b="1" i="1" dirty="0" smtClean="0">
-                <a:cs typeface="Courier New" panose="02070309020205020404" pitchFamily="49" charset="0"/>
-              </a:rPr>
-              <a:t>rdfs</a:t>
-            </a:r>
-            <a:r>
               <a:rPr lang="en-US" sz="3200" b="1" i="1" dirty="0">
                 <a:cs typeface="Courier New" panose="02070309020205020404" pitchFamily="49" charset="0"/>
               </a:rPr>
-              <a:t>:          </a:t>
-            </a:r>
-            <a:r>
-              <a:rPr lang="en-US" sz="3200" b="1" i="1" dirty="0" smtClean="0">
-                <a:cs typeface="Courier New" panose="02070309020205020404" pitchFamily="49" charset="0"/>
-              </a:rPr>
-              <a:t> </a:t>
-            </a:r>
-            <a:r>
-              <a:rPr lang="en-US" sz="3200" dirty="0" smtClean="0">
-                <a:latin typeface="Courier New" panose="02070309020205020404" pitchFamily="49" charset="0"/>
-                <a:cs typeface="Courier New" panose="02070309020205020404" pitchFamily="49" charset="0"/>
-              </a:rPr>
-              <a:t>http</a:t>
+              <a:t>rdfs:           </a:t>
             </a:r>
             <a:r>
               <a:rPr lang="en-US" sz="3200" dirty="0">
                 <a:latin typeface="Courier New" panose="02070309020205020404" pitchFamily="49" charset="0"/>
                 <a:cs typeface="Courier New" panose="02070309020205020404" pitchFamily="49" charset="0"/>
               </a:rPr>
-              <a:t>://www.w3.org/2000/01/rdf-schema#</a:t>
-            </a:r>
-            <a:endParaRPr lang="en-US" sz="3200" dirty="0" smtClean="0">
-              <a:latin typeface="Courier New" panose="02070309020205020404" pitchFamily="49" charset="0"/>
-              <a:cs typeface="Courier New" panose="02070309020205020404" pitchFamily="49" charset="0"/>
-            </a:endParaRPr>
-          </a:p>
-          <a:p>
-            <a:r>
-              <a:rPr lang="en-US" sz="3200" b="1" i="1" dirty="0" smtClean="0">
+              <a:t>http://www.w3.org/2000/01/rdf-schema#</a:t>
+            </a:r>
+          </a:p>
+          <a:p>
+            <a:r>
+              <a:rPr lang="en-US" sz="3200" b="1" i="1" dirty="0">
                 <a:cs typeface="Courier New" panose="02070309020205020404" pitchFamily="49" charset="0"/>
               </a:rPr>
               <a:t>dwc:</a:t>
             </a:r>
             <a:r>
-              <a:rPr lang="en-US" sz="3200" dirty="0" smtClean="0">
+              <a:rPr lang="en-US" sz="3200" dirty="0">
                 <a:cs typeface="Courier New" panose="02070309020205020404" pitchFamily="49" charset="0"/>
               </a:rPr>
               <a:t>           </a:t>
-            </a:r>
-            <a:r>
-              <a:rPr lang="en-US" sz="3200" dirty="0" smtClean="0">
-                <a:latin typeface="Courier New" panose="02070309020205020404" pitchFamily="49" charset="0"/>
-                <a:cs typeface="Courier New" panose="02070309020205020404" pitchFamily="49" charset="0"/>
-              </a:rPr>
-              <a:t>http</a:t>
             </a:r>
             <a:r>
               <a:rPr lang="en-US" sz="3200" dirty="0">
                 <a:latin typeface="Courier New" panose="02070309020205020404" pitchFamily="49" charset="0"/>
                 <a:cs typeface="Courier New" panose="02070309020205020404" pitchFamily="49" charset="0"/>
               </a:rPr>
-              <a:t>://rs.tdwg.org/dwc/terms</a:t>
-            </a:r>
-            <a:r>
-              <a:rPr lang="en-US" sz="3200" dirty="0" smtClean="0">
-                <a:latin typeface="Courier New" panose="02070309020205020404" pitchFamily="49" charset="0"/>
-                <a:cs typeface="Courier New" panose="02070309020205020404" pitchFamily="49" charset="0"/>
-              </a:rPr>
-              <a:t>/</a:t>
-            </a:r>
-          </a:p>
-          <a:p>
-            <a:r>
-              <a:rPr lang="en-US" sz="3200" b="1" i="1" dirty="0" smtClean="0">
-                <a:cs typeface="Courier New" panose="02070309020205020404" pitchFamily="49" charset="0"/>
-              </a:rPr>
-              <a:t>dwciri</a:t>
-            </a:r>
+              <a:t>http://rs.tdwg.org/dwc/terms/</a:t>
+            </a:r>
+          </a:p>
+          <a:p>
             <a:r>
               <a:rPr lang="en-US" sz="3200" b="1" i="1" dirty="0">
                 <a:cs typeface="Courier New" panose="02070309020205020404" pitchFamily="49" charset="0"/>
               </a:rPr>
-              <a:t>:</a:t>
+              <a:t>dwciri:</a:t>
             </a:r>
             <a:r>
               <a:rPr lang="en-US" sz="3200" dirty="0">
                 <a:latin typeface="Courier New" panose="02070309020205020404" pitchFamily="49" charset="0"/>
                 <a:cs typeface="Courier New" panose="02070309020205020404" pitchFamily="49" charset="0"/>
               </a:rPr>
-              <a:t> </a:t>
-            </a:r>
-            <a:r>
-              <a:rPr lang="en-US" sz="3200" dirty="0" smtClean="0">
-                <a:latin typeface="Courier New" panose="02070309020205020404" pitchFamily="49" charset="0"/>
+              <a:t>  http://rs.tdwg.org/dwc/iri/</a:t>
+            </a:r>
+          </a:p>
+          <a:p>
+            <a:r>
+              <a:rPr lang="en-US" sz="3200" b="1" i="1" dirty="0">
                 <a:cs typeface="Courier New" panose="02070309020205020404" pitchFamily="49" charset="0"/>
               </a:rPr>
-              <a:t> http</a:t>
+              <a:t>dsw:</a:t>
             </a:r>
             <a:r>
               <a:rPr lang="en-US" sz="3200" dirty="0">
                 <a:latin typeface="Courier New" panose="02070309020205020404" pitchFamily="49" charset="0"/>
                 <a:cs typeface="Courier New" panose="02070309020205020404" pitchFamily="49" charset="0"/>
               </a:rPr>
-              <a:t>://</a:t>
-            </a:r>
-            <a:r>
-              <a:rPr lang="en-US" sz="3200" dirty="0" smtClean="0">
-                <a:latin typeface="Courier New" panose="02070309020205020404" pitchFamily="49" charset="0"/>
+              <a:t>    http://purl.org/dsw/</a:t>
+            </a:r>
+          </a:p>
+          <a:p>
+            <a:r>
+              <a:rPr lang="en-US" sz="3200" b="1" i="1" dirty="0">
                 <a:cs typeface="Courier New" panose="02070309020205020404" pitchFamily="49" charset="0"/>
               </a:rPr>
-              <a:t>rs.tdwg.org/dwc/iri</a:t>
+              <a:t>tc:</a:t>
             </a:r>
             <a:r>
               <a:rPr lang="en-US" sz="3200" dirty="0">
                 <a:latin typeface="Courier New" panose="02070309020205020404" pitchFamily="49" charset="0"/>
                 <a:cs typeface="Courier New" panose="02070309020205020404" pitchFamily="49" charset="0"/>
               </a:rPr>
-              <a:t>/</a:t>
-            </a:r>
-            <a:endParaRPr lang="en-US" sz="3200" dirty="0" smtClean="0">
-              <a:latin typeface="Courier New" panose="02070309020205020404" pitchFamily="49" charset="0"/>
-              <a:cs typeface="Courier New" panose="02070309020205020404" pitchFamily="49" charset="0"/>
-            </a:endParaRPr>
-          </a:p>
-          <a:p>
-            <a:r>
-              <a:rPr lang="en-US" sz="3200" b="1" i="1" dirty="0" smtClean="0">
+              <a:t>     http://rs.tdwg.org/ontology/voc/TaxonConcept#</a:t>
+            </a:r>
+          </a:p>
+          <a:p>
+            <a:r>
+              <a:rPr lang="en-US" sz="3200" b="1" i="1" dirty="0">
                 <a:cs typeface="Courier New" panose="02070309020205020404" pitchFamily="49" charset="0"/>
               </a:rPr>
-              <a:t>dsw</a:t>
-            </a:r>
-            <a:r>
-              <a:rPr lang="en-US" sz="3200" b="1" i="1" dirty="0" smtClean="0">
-                <a:cs typeface="Courier New" panose="02070309020205020404" pitchFamily="49" charset="0"/>
-              </a:rPr>
-              <a:t>:</a:t>
-            </a:r>
-            <a:r>
-              <a:rPr lang="en-US" sz="3200" dirty="0" smtClean="0">
-                <a:latin typeface="Courier New" panose="02070309020205020404" pitchFamily="49" charset="0"/>
-                <a:cs typeface="Courier New" panose="02070309020205020404" pitchFamily="49" charset="0"/>
-              </a:rPr>
-              <a:t>    http://purl.org/dsw/</a:t>
-            </a:r>
-          </a:p>
-          <a:p>
-            <a:r>
-              <a:rPr lang="en-US" sz="3200" b="1" i="1" dirty="0" smtClean="0">
-                <a:cs typeface="Courier New" panose="02070309020205020404" pitchFamily="49" charset="0"/>
-              </a:rPr>
-              <a:t>tc:</a:t>
-            </a:r>
-            <a:r>
-              <a:rPr lang="en-US" sz="3200" dirty="0" smtClean="0">
-                <a:latin typeface="Courier New" panose="02070309020205020404" pitchFamily="49" charset="0"/>
-                <a:cs typeface="Courier New" panose="02070309020205020404" pitchFamily="49" charset="0"/>
-              </a:rPr>
-              <a:t>     http</a:t>
+              <a:t>dcterms:</a:t>
             </a:r>
             <a:r>
               <a:rPr lang="en-US" sz="3200" dirty="0">
                 <a:latin typeface="Courier New" panose="02070309020205020404" pitchFamily="49" charset="0"/>
                 <a:cs typeface="Courier New" panose="02070309020205020404" pitchFamily="49" charset="0"/>
               </a:rPr>
-              <a:t>://rs.tdwg.org/ontology/voc/TaxonConcept</a:t>
-            </a:r>
-            <a:r>
-              <a:rPr lang="en-US" sz="3200" dirty="0" smtClean="0">
-                <a:latin typeface="Courier New" panose="02070309020205020404" pitchFamily="49" charset="0"/>
-                <a:cs typeface="Courier New" panose="02070309020205020404" pitchFamily="49" charset="0"/>
-              </a:rPr>
-              <a:t>#</a:t>
-            </a:r>
-          </a:p>
-          <a:p>
-            <a:r>
-              <a:rPr lang="en-US" sz="3200" b="1" i="1" dirty="0" smtClean="0">
-                <a:cs typeface="Courier New" panose="02070309020205020404" pitchFamily="49" charset="0"/>
-              </a:rPr>
-              <a:t>dcterms</a:t>
-            </a:r>
+              <a:t> http://purl.org/dc/terms/</a:t>
+            </a:r>
+          </a:p>
+          <a:p>
             <a:r>
               <a:rPr lang="en-US" sz="3200" b="1" i="1" dirty="0">
                 <a:cs typeface="Courier New" panose="02070309020205020404" pitchFamily="49" charset="0"/>
               </a:rPr>
-              <a:t>:</a:t>
+              <a:t>dcmitype: </a:t>
             </a:r>
             <a:r>
               <a:rPr lang="en-US" sz="3200" dirty="0">
                 <a:latin typeface="Courier New" panose="02070309020205020404" pitchFamily="49" charset="0"/>
                 <a:cs typeface="Courier New" panose="02070309020205020404" pitchFamily="49" charset="0"/>
               </a:rPr>
-              <a:t> http://purl.org/dc/terms</a:t>
-            </a:r>
-            <a:r>
-              <a:rPr lang="en-US" sz="3200" dirty="0" smtClean="0">
-                <a:latin typeface="Courier New" panose="02070309020205020404" pitchFamily="49" charset="0"/>
+              <a:t>http://purl.org/dc/dcmitype/</a:t>
+            </a:r>
+          </a:p>
+          <a:p>
+            <a:r>
+              <a:rPr lang="en-US" sz="3200" b="1" i="1" dirty="0">
                 <a:cs typeface="Courier New" panose="02070309020205020404" pitchFamily="49" charset="0"/>
               </a:rPr>
-              <a:t>/</a:t>
-            </a:r>
-          </a:p>
-          <a:p>
-            <a:r>
-              <a:rPr lang="en-US" sz="3200" b="1" i="1" dirty="0" smtClean="0">
-                <a:cs typeface="Courier New" panose="02070309020205020404" pitchFamily="49" charset="0"/>
-              </a:rPr>
-              <a:t>dcmitype: </a:t>
-            </a:r>
-            <a:r>
-              <a:rPr lang="en-US" sz="3200" dirty="0" smtClean="0">
-                <a:latin typeface="Courier New" panose="02070309020205020404" pitchFamily="49" charset="0"/>
-                <a:cs typeface="Courier New" panose="02070309020205020404" pitchFamily="49" charset="0"/>
-              </a:rPr>
-              <a:t>http</a:t>
+              <a:t>foaf:          </a:t>
             </a:r>
             <a:r>
               <a:rPr lang="en-US" sz="3200" dirty="0">
                 <a:latin typeface="Courier New" panose="02070309020205020404" pitchFamily="49" charset="0"/>
                 <a:cs typeface="Courier New" panose="02070309020205020404" pitchFamily="49" charset="0"/>
               </a:rPr>
-              <a:t>://purl.org/dc/dcmitype/</a:t>
-            </a:r>
-            <a:endParaRPr lang="en-US" sz="3200" dirty="0" smtClean="0">
-              <a:latin typeface="Courier New" panose="02070309020205020404" pitchFamily="49" charset="0"/>
-              <a:cs typeface="Courier New" panose="02070309020205020404" pitchFamily="49" charset="0"/>
-            </a:endParaRPr>
-          </a:p>
-          <a:p>
-            <a:r>
-              <a:rPr lang="en-US" sz="3200" b="1" i="1" dirty="0" smtClean="0">
-                <a:cs typeface="Courier New" panose="02070309020205020404" pitchFamily="49" charset="0"/>
-              </a:rPr>
-              <a:t>foaf</a:t>
-            </a:r>
+              <a:t>http://xmlns.com/foaf/0.1/</a:t>
+            </a:r>
+          </a:p>
+          <a:p>
             <a:r>
               <a:rPr lang="en-US" sz="3200" b="1" i="1" dirty="0">
                 <a:cs typeface="Courier New" panose="02070309020205020404" pitchFamily="49" charset="0"/>
               </a:rPr>
-              <a:t>: </a:t>
-            </a:r>
-            <a:r>
-              <a:rPr lang="en-US" sz="3200" b="1" i="1" dirty="0" smtClean="0">
-                <a:cs typeface="Courier New" panose="02070309020205020404" pitchFamily="49" charset="0"/>
-              </a:rPr>
-              <a:t>         </a:t>
-            </a:r>
-            <a:r>
-              <a:rPr lang="en-US" sz="3200" dirty="0" smtClean="0">
-                <a:latin typeface="Courier New" panose="02070309020205020404" pitchFamily="49" charset="0"/>
-                <a:cs typeface="Courier New" panose="02070309020205020404" pitchFamily="49" charset="0"/>
-              </a:rPr>
-              <a:t>http</a:t>
+              <a:t>gn:</a:t>
             </a:r>
             <a:r>
               <a:rPr lang="en-US" sz="3200" dirty="0">
                 <a:latin typeface="Courier New" panose="02070309020205020404" pitchFamily="49" charset="0"/>
                 <a:cs typeface="Courier New" panose="02070309020205020404" pitchFamily="49" charset="0"/>
               </a:rPr>
-              <a:t>://xmlns.com/foaf/0.1</a:t>
-            </a:r>
-            <a:r>
-              <a:rPr lang="en-US" sz="3200" dirty="0" smtClean="0">
-                <a:latin typeface="Courier New" panose="02070309020205020404" pitchFamily="49" charset="0"/>
-                <a:cs typeface="Courier New" panose="02070309020205020404" pitchFamily="49" charset="0"/>
-              </a:rPr>
-              <a:t>/</a:t>
-            </a:r>
-          </a:p>
-          <a:p>
-            <a:r>
-              <a:rPr lang="en-US" sz="3200" b="1" i="1" dirty="0" smtClean="0">
-                <a:cs typeface="Courier New" panose="02070309020205020404" pitchFamily="49" charset="0"/>
-              </a:rPr>
-              <a:t>gn</a:t>
-            </a:r>
-            <a:r>
-              <a:rPr lang="en-US" sz="3200" b="1" i="1" dirty="0">
-                <a:cs typeface="Courier New" panose="02070309020205020404" pitchFamily="49" charset="0"/>
-              </a:rPr>
-              <a:t>:</a:t>
-            </a:r>
-            <a:r>
-              <a:rPr lang="en-US" sz="3200" dirty="0">
-                <a:latin typeface="Courier New" panose="02070309020205020404" pitchFamily="49" charset="0"/>
-                <a:cs typeface="Courier New" panose="02070309020205020404" pitchFamily="49" charset="0"/>
-              </a:rPr>
-              <a:t>   </a:t>
-            </a:r>
-            <a:r>
-              <a:rPr lang="en-US" sz="3200" dirty="0" smtClean="0">
-                <a:latin typeface="Courier New" panose="02070309020205020404" pitchFamily="49" charset="0"/>
-                <a:cs typeface="Courier New" panose="02070309020205020404" pitchFamily="49" charset="0"/>
-              </a:rPr>
-              <a:t>  http</a:t>
-            </a:r>
-            <a:r>
-              <a:rPr lang="en-US" sz="3200" dirty="0">
-                <a:latin typeface="Courier New" panose="02070309020205020404" pitchFamily="49" charset="0"/>
-                <a:cs typeface="Courier New" panose="02070309020205020404" pitchFamily="49" charset="0"/>
-              </a:rPr>
-              <a:t>://www.geonames.org/ontology#</a:t>
-            </a:r>
-            <a:endParaRPr lang="en-US" sz="3200" dirty="0" smtClean="0">
-              <a:latin typeface="Courier New" panose="02070309020205020404" pitchFamily="49" charset="0"/>
-              <a:cs typeface="Courier New" panose="02070309020205020404" pitchFamily="49" charset="0"/>
-            </a:endParaRPr>
+              <a:t>     http://www.geonames.org/ontology#</a:t>
+            </a:r>
           </a:p>
         </p:txBody>
       </p:sp>
@@ -6952,26 +6505,14 @@
           <a:p>
             <a:pPr algn="ctr"/>
             <a:r>
-              <a:rPr lang="en-US" sz="4400" b="1" dirty="0" smtClean="0"/>
-              <a:t>Darwin-SW </a:t>
-            </a:r>
-            <a:r>
-              <a:rPr lang="en-US" sz="4400" b="1" dirty="0" smtClean="0"/>
-              <a:t>(DSW</a:t>
-            </a:r>
-            <a:r>
-              <a:rPr lang="en-US" sz="4400" b="1" dirty="0" smtClean="0"/>
-              <a:t>) 1.0 </a:t>
-            </a:r>
-            <a:r>
-              <a:rPr lang="en-US" sz="4400" b="1" dirty="0" smtClean="0"/>
-              <a:t>ontology </a:t>
+              <a:rPr lang="en-US" sz="4400" b="1" dirty="0"/>
+              <a:t>Darwin-SW (DSW) 1.0 ontology </a:t>
             </a:r>
           </a:p>
           <a:p>
             <a:pPr algn="ctr"/>
             <a:r>
-              <a:rPr lang="en-US" sz="4400" b="1" dirty="0" smtClean="0"/>
+              <a:rPr lang="en-US" sz="4400" b="1" dirty="0"/>
               <a:t>mapped on the 1993</a:t>
             </a:r>
           </a:p>
@@ -6979,17 +6520,13 @@
             <a:pPr algn="ctr"/>
             <a:r>
               <a:rPr lang="en-US" sz="4400" b="1" dirty="0"/>
-              <a:t>Association of Systematics </a:t>
-            </a:r>
-            <a:r>
-              <a:rPr lang="en-US" sz="4400" b="1" dirty="0" smtClean="0"/>
-              <a:t>Collections </a:t>
+              <a:t>Association of Systematics Collections </a:t>
             </a:r>
           </a:p>
           <a:p>
             <a:pPr algn="ctr"/>
             <a:r>
-              <a:rPr lang="en-US" sz="4400" b="1" dirty="0" smtClean="0"/>
+              <a:rPr lang="en-US" sz="4400" b="1" dirty="0"/>
               <a:t>(ASC) Model</a:t>
             </a:r>
           </a:p>
@@ -7018,13 +6555,13 @@
           <a:lstStyle/>
           <a:p>
             <a:r>
-              <a:rPr lang="en-US" sz="3200" dirty="0" smtClean="0"/>
+              <a:rPr lang="en-US" sz="3200" dirty="0"/>
               <a:t>Steven J. Baskauf – Vanderbilt University</a:t>
             </a:r>
           </a:p>
           <a:p>
             <a:r>
-              <a:rPr lang="en-US" sz="3200" dirty="0" smtClean="0"/>
+              <a:rPr lang="en-US" sz="3200" dirty="0"/>
               <a:t>Campbell O. Webb – Arnold Arboretum of Harvard University</a:t>
             </a:r>
           </a:p>
@@ -7033,27 +6570,19 @@
           </a:p>
           <a:p>
             <a:r>
-              <a:rPr lang="en-US" sz="3200" dirty="0" smtClean="0"/>
+              <a:rPr lang="en-US" sz="3200" dirty="0"/>
               <a:t>Basic class relationships laid out by Richard L. Pyle</a:t>
             </a:r>
           </a:p>
           <a:p>
             <a:r>
-              <a:rPr lang="en-US" sz="2800" dirty="0" smtClean="0"/>
-              <a:t>http</a:t>
-            </a:r>
-            <a:r>
               <a:rPr lang="en-US" sz="2800" dirty="0"/>
-              <a:t>://</a:t>
-            </a:r>
-            <a:r>
-              <a:rPr lang="en-US" sz="2800" dirty="0" smtClean="0"/>
-              <a:t>lists.tdwg.org/pipermail/tdwg-content/2010-October/001703.html</a:t>
-            </a:r>
-          </a:p>
-          <a:p>
-            <a:r>
-              <a:rPr lang="en-US" sz="3200" dirty="0" smtClean="0"/>
+              <a:t>http://lists.tdwg.org/pipermail/tdwg-content/2010-October/001703.html</a:t>
+            </a:r>
+          </a:p>
+          <a:p>
+            <a:r>
+              <a:rPr lang="en-US" sz="3200" dirty="0"/>
               <a:t>Similarity to ASC model noted by Greg Whitbread</a:t>
             </a:r>
           </a:p>
@@ -7088,10 +6617,9 @@
           <a:lstStyle/>
           <a:p>
             <a:r>
-              <a:rPr lang="en-US" sz="4400" b="1" dirty="0" smtClean="0"/>
+              <a:rPr lang="en-US" sz="4400" b="1" dirty="0"/>
               <a:t>Sources:</a:t>
             </a:r>
-            <a:endParaRPr lang="en-US" sz="4400" b="1" dirty="0"/>
           </a:p>
         </p:txBody>
       </p:sp>
@@ -7105,13 +6633,6 @@
   <p:clrMapOvr>
     <a:masterClrMapping/>
   </p:clrMapOvr>
-  <p:timing>
-    <p:tnLst>
-      <p:par>
-        <p:cTn id="1" dur="indefinite" restart="never" nodeType="tmRoot"/>
-      </p:par>
-    </p:tnLst>
-  </p:timing>
 </p:sld>
 </file>
 

</xml_diff>